<commit_message>
Intro,Overview and image processing is now complete.
</commit_message>
<xml_diff>
--- a/OralExamination/SkripsieOral_APSmit.pptx
+++ b/OralExamination/SkripsieOral_APSmit.pptx
@@ -17,7 +17,7 @@
     <p:sldId id="683" r:id="rId5"/>
     <p:sldId id="684" r:id="rId6"/>
     <p:sldId id="608" r:id="rId7"/>
-    <p:sldId id="681" r:id="rId8"/>
+    <p:sldId id="685" r:id="rId8"/>
   </p:sldIdLst>
   <p:sldSz cx="12192000" cy="6858000"/>
   <p:notesSz cx="7315200" cy="9601200"/>
@@ -4786,7 +4786,7 @@
           <a:p>
             <a:r>
               <a:rPr lang="en-US" dirty="0"/>
-              <a:t>Problem statement</a:t>
+              <a:t>Introduction</a:t>
             </a:r>
           </a:p>
           <a:p>
@@ -4913,7 +4913,7 @@
           <a:p>
             <a:r>
               <a:rPr lang="en-ZA" dirty="0"/>
-              <a:t>Problem statement</a:t>
+              <a:t>Introduction</a:t>
             </a:r>
           </a:p>
         </p:txBody>
@@ -6760,6 +6760,41 @@
           <a:chExt cx="0" cy="0"/>
         </a:xfrm>
       </p:grpSpPr>
+      <p:pic>
+        <p:nvPicPr>
+          <p:cNvPr id="37" name="Picture 36">
+            <a:extLst>
+              <a:ext uri="{FF2B5EF4-FFF2-40B4-BE49-F238E27FC236}">
+                <a16:creationId xmlns:a16="http://schemas.microsoft.com/office/drawing/2014/main" id="{D45EB7C5-48C4-4711-8A31-AF06944136BA}"/>
+              </a:ext>
+            </a:extLst>
+          </p:cNvPr>
+          <p:cNvPicPr>
+            <a:picLocks noChangeAspect="1"/>
+          </p:cNvPicPr>
+          <p:nvPr/>
+        </p:nvPicPr>
+        <p:blipFill rotWithShape="1">
+          <a:blip r:embed="rId3" cstate="print">
+            <a:extLst>
+              <a:ext uri="{28A0092B-C50C-407E-A947-70E740481C1C}">
+                <a14:useLocalDpi xmlns:a14="http://schemas.microsoft.com/office/drawing/2010/main" val="0"/>
+              </a:ext>
+            </a:extLst>
+          </a:blip>
+          <a:srcRect l="1903" t="2281" b="-991"/>
+          <a:stretch/>
+        </p:blipFill>
+        <p:spPr>
+          <a:xfrm>
+            <a:off x="2951463" y="1892445"/>
+            <a:ext cx="3369816" cy="4752191"/>
+          </a:xfrm>
+          <a:prstGeom prst="rect">
+            <a:avLst/>
+          </a:prstGeom>
+        </p:spPr>
+      </p:pic>
       <p:sp>
         <p:nvSpPr>
           <p:cNvPr id="2" name="Title 1"/>
@@ -6777,7 +6812,7 @@
           <a:p>
             <a:r>
               <a:rPr lang="en-US" dirty="0"/>
-              <a:t>Introduction</a:t>
+              <a:t>Image Processing</a:t>
             </a:r>
             <a:endParaRPr lang="en-ZA" dirty="0"/>
           </a:p>
@@ -6799,61 +6834,30 @@
           <a:lstStyle/>
           <a:p>
             <a:r>
-              <a:rPr lang="en-ZA" dirty="0"/>
-              <a:t>The erosion characteristics of shells and shell fragments are investigated</a:t>
-            </a:r>
-          </a:p>
-          <a:p>
-            <a:r>
-              <a:rPr lang="en-ZA" dirty="0"/>
-              <a:t>The incipient motion of shells and shell fragments has been studied experimentally by researchers (</a:t>
-            </a:r>
-            <a:r>
-              <a:rPr lang="en-ZA" dirty="0" err="1"/>
-              <a:t>Dey</a:t>
-            </a:r>
-            <a:r>
-              <a:rPr lang="en-ZA" dirty="0"/>
-              <a:t> (2001, 2004))</a:t>
-            </a:r>
-          </a:p>
-          <a:p>
-            <a:r>
-              <a:rPr lang="en-GB" dirty="0" err="1"/>
-              <a:t>Ramsdell</a:t>
-            </a:r>
-            <a:r>
-              <a:rPr lang="en-GB" dirty="0"/>
-              <a:t> </a:t>
-            </a:r>
-            <a:r>
-              <a:rPr lang="en-ZA" dirty="0"/>
-              <a:t>and </a:t>
-            </a:r>
-            <a:r>
-              <a:rPr lang="en-ZA" dirty="0" err="1"/>
-              <a:t>Miedema</a:t>
-            </a:r>
-            <a:r>
-              <a:rPr lang="en-ZA" dirty="0"/>
-              <a:t> (2010); </a:t>
-            </a:r>
-            <a:r>
-              <a:rPr lang="en-ZA" dirty="0" err="1"/>
-              <a:t>Miedema</a:t>
-            </a:r>
-            <a:r>
-              <a:rPr lang="en-ZA" dirty="0"/>
-              <a:t> and </a:t>
-            </a:r>
-            <a:r>
-              <a:rPr lang="en-ZA" dirty="0" err="1"/>
-              <a:t>Ramsdell</a:t>
-            </a:r>
-            <a:r>
-              <a:rPr lang="en-ZA" dirty="0"/>
-              <a:t> (2011) related findings of the critical shear stress for erosion to a Shields diagram for non-uniform particle distributions</a:t>
-            </a:r>
+              <a:rPr lang="en-ZA" kern="1200" dirty="0">
+                <a:effectLst>
+                  <a:outerShdw blurRad="38100" dist="38100" dir="2700000" algn="tl">
+                    <a:srgbClr val="000000">
+                      <a:alpha val="43137"/>
+                    </a:srgbClr>
+                  </a:outerShdw>
+                </a:effectLst>
+                <a:latin typeface="Times New Roman" pitchFamily="18" charset="0"/>
+              </a:rPr>
+              <a:t> First step is to find the orientation of the template</a:t>
+            </a:r>
+          </a:p>
+          <a:p>
+            <a:endParaRPr lang="en-ZA" kern="1200" dirty="0">
+              <a:effectLst>
+                <a:outerShdw blurRad="38100" dist="38100" dir="2700000" algn="tl">
+                  <a:srgbClr val="000000">
+                    <a:alpha val="43137"/>
+                  </a:srgbClr>
+                </a:outerShdw>
+              </a:effectLst>
+              <a:latin typeface="Times New Roman" pitchFamily="18" charset="0"/>
+            </a:endParaRPr>
           </a:p>
         </p:txBody>
       </p:sp>
@@ -6867,7 +6871,12 @@
             <p:ph type="sldNum" sz="quarter" idx="10"/>
           </p:nvPr>
         </p:nvSpPr>
-        <p:spPr/>
+        <p:spPr>
+          <a:xfrm>
+            <a:off x="609600" y="6405560"/>
+            <a:ext cx="2540000" cy="457200"/>
+          </a:xfrm>
+        </p:spPr>
         <p:txBody>
           <a:bodyPr/>
           <a:lstStyle/>
@@ -6881,6 +6890,508 @@
           </a:p>
         </p:txBody>
       </p:sp>
+      <p:pic>
+        <p:nvPicPr>
+          <p:cNvPr id="6" name="Picture 5">
+            <a:extLst>
+              <a:ext uri="{FF2B5EF4-FFF2-40B4-BE49-F238E27FC236}">
+                <a16:creationId xmlns:a16="http://schemas.microsoft.com/office/drawing/2014/main" id="{DFC384C2-16DC-4529-A0A3-CA807AC56920}"/>
+              </a:ext>
+            </a:extLst>
+          </p:cNvPr>
+          <p:cNvPicPr>
+            <a:picLocks noChangeAspect="1"/>
+          </p:cNvPicPr>
+          <p:nvPr/>
+        </p:nvPicPr>
+        <p:blipFill rotWithShape="1">
+          <a:blip r:embed="rId4">
+            <a:extLst>
+              <a:ext uri="{28A0092B-C50C-407E-A947-70E740481C1C}">
+                <a14:useLocalDpi xmlns:a14="http://schemas.microsoft.com/office/drawing/2010/main" val="0"/>
+              </a:ext>
+            </a:extLst>
+          </a:blip>
+          <a:srcRect l="5516" t="3740" r="5341" b="1698"/>
+          <a:stretch/>
+        </p:blipFill>
+        <p:spPr>
+          <a:xfrm>
+            <a:off x="7682148" y="1883502"/>
+            <a:ext cx="3542366" cy="4522058"/>
+          </a:xfrm>
+          <a:prstGeom prst="rect">
+            <a:avLst/>
+          </a:prstGeom>
+        </p:spPr>
+      </p:pic>
+      <p:cxnSp>
+        <p:nvCxnSpPr>
+          <p:cNvPr id="12" name="Straight Connector 11">
+            <a:extLst>
+              <a:ext uri="{FF2B5EF4-FFF2-40B4-BE49-F238E27FC236}">
+                <a16:creationId xmlns:a16="http://schemas.microsoft.com/office/drawing/2014/main" id="{C6FC822A-662A-4084-A947-4E9162C36ED5}"/>
+              </a:ext>
+            </a:extLst>
+          </p:cNvPr>
+          <p:cNvCxnSpPr>
+            <a:cxnSpLocks/>
+          </p:cNvCxnSpPr>
+          <p:nvPr/>
+        </p:nvCxnSpPr>
+        <p:spPr bwMode="auto">
+          <a:xfrm>
+            <a:off x="2889250" y="3378829"/>
+            <a:ext cx="3333325" cy="24767"/>
+          </a:xfrm>
+          <a:prstGeom prst="line">
+            <a:avLst/>
+          </a:prstGeom>
+          <a:solidFill>
+            <a:schemeClr val="accent1"/>
+          </a:solidFill>
+          <a:ln w="12700" cap="sq" cmpd="sng" algn="ctr">
+            <a:solidFill>
+              <a:srgbClr val="0070C0"/>
+            </a:solidFill>
+            <a:prstDash val="solid"/>
+            <a:round/>
+            <a:headEnd type="none" w="sm" len="sm"/>
+            <a:tailEnd type="none" w="sm" len="sm"/>
+          </a:ln>
+          <a:effectLst/>
+        </p:spPr>
+      </p:cxnSp>
+      <p:cxnSp>
+        <p:nvCxnSpPr>
+          <p:cNvPr id="17" name="Straight Connector 16">
+            <a:extLst>
+              <a:ext uri="{FF2B5EF4-FFF2-40B4-BE49-F238E27FC236}">
+                <a16:creationId xmlns:a16="http://schemas.microsoft.com/office/drawing/2014/main" id="{64E4A50E-D785-4CD3-BA37-490A4571AE1A}"/>
+              </a:ext>
+            </a:extLst>
+          </p:cNvPr>
+          <p:cNvCxnSpPr>
+            <a:cxnSpLocks/>
+          </p:cNvCxnSpPr>
+          <p:nvPr/>
+        </p:nvCxnSpPr>
+        <p:spPr bwMode="auto">
+          <a:xfrm flipH="1">
+            <a:off x="4624915" y="2095496"/>
+            <a:ext cx="26460" cy="4381500"/>
+          </a:xfrm>
+          <a:prstGeom prst="line">
+            <a:avLst/>
+          </a:prstGeom>
+          <a:solidFill>
+            <a:schemeClr val="accent1"/>
+          </a:solidFill>
+          <a:ln w="12700" cap="sq" cmpd="sng" algn="ctr">
+            <a:solidFill>
+              <a:srgbClr val="92D050"/>
+            </a:solidFill>
+            <a:prstDash val="solid"/>
+            <a:round/>
+            <a:headEnd type="none" w="sm" len="sm"/>
+            <a:tailEnd type="none" w="sm" len="sm"/>
+          </a:ln>
+          <a:effectLst/>
+        </p:spPr>
+      </p:cxnSp>
+      <p:sp>
+        <p:nvSpPr>
+          <p:cNvPr id="18" name="Oval 17">
+            <a:extLst>
+              <a:ext uri="{FF2B5EF4-FFF2-40B4-BE49-F238E27FC236}">
+                <a16:creationId xmlns:a16="http://schemas.microsoft.com/office/drawing/2014/main" id="{6371A327-D392-41F0-AE8F-822862290DC0}"/>
+              </a:ext>
+            </a:extLst>
+          </p:cNvPr>
+          <p:cNvSpPr/>
+          <p:nvPr/>
+        </p:nvSpPr>
+        <p:spPr bwMode="auto">
+          <a:xfrm>
+            <a:off x="4621740" y="3372479"/>
+            <a:ext cx="45719" cy="45719"/>
+          </a:xfrm>
+          <a:prstGeom prst="ellipse">
+            <a:avLst/>
+          </a:prstGeom>
+          <a:solidFill>
+            <a:srgbClr val="FF0000"/>
+          </a:solidFill>
+          <a:ln w="12700" cap="sq" cmpd="sng" algn="ctr">
+            <a:solidFill>
+              <a:srgbClr val="FF0000"/>
+            </a:solidFill>
+            <a:prstDash val="solid"/>
+            <a:round/>
+            <a:headEnd type="none" w="sm" len="sm"/>
+            <a:tailEnd type="none" w="sm" len="sm"/>
+          </a:ln>
+          <a:effectLst/>
+        </p:spPr>
+        <p:txBody>
+          <a:bodyPr vert="horz" wrap="square" lIns="91440" tIns="45720" rIns="91440" bIns="45720" numCol="1" rtlCol="0" anchor="t" anchorCtr="0" compatLnSpc="1">
+            <a:prstTxWarp prst="textNoShape">
+              <a:avLst/>
+            </a:prstTxWarp>
+          </a:bodyPr>
+          <a:lstStyle/>
+          <a:p>
+            <a:pPr marL="0" marR="0" indent="0" algn="l" defTabSz="914400" rtl="0" eaLnBrk="1" fontAlgn="base" latinLnBrk="0" hangingPunct="1">
+              <a:lnSpc>
+                <a:spcPct val="100000"/>
+              </a:lnSpc>
+              <a:spcBef>
+                <a:spcPct val="0"/>
+              </a:spcBef>
+              <a:spcAft>
+                <a:spcPct val="0"/>
+              </a:spcAft>
+              <a:buClrTx/>
+              <a:buSzTx/>
+              <a:buFontTx/>
+              <a:buNone/>
+              <a:tabLst/>
+            </a:pPr>
+            <a:endParaRPr kumimoji="0" lang="en-ZA" sz="2400" b="0" i="0" u="none" strike="noStrike" cap="none" normalizeH="0" baseline="0">
+              <a:ln>
+                <a:noFill/>
+              </a:ln>
+              <a:solidFill>
+                <a:schemeClr val="tx1"/>
+              </a:solidFill>
+              <a:effectLst/>
+              <a:latin typeface="Times New Roman" pitchFamily="18" charset="0"/>
+            </a:endParaRPr>
+          </a:p>
+        </p:txBody>
+      </p:sp>
+      <p:cxnSp>
+        <p:nvCxnSpPr>
+          <p:cNvPr id="34" name="Straight Connector 33">
+            <a:extLst>
+              <a:ext uri="{FF2B5EF4-FFF2-40B4-BE49-F238E27FC236}">
+                <a16:creationId xmlns:a16="http://schemas.microsoft.com/office/drawing/2014/main" id="{09753472-D731-48D2-8F2E-86B6DD44869A}"/>
+              </a:ext>
+            </a:extLst>
+          </p:cNvPr>
+          <p:cNvCxnSpPr>
+            <a:cxnSpLocks/>
+          </p:cNvCxnSpPr>
+          <p:nvPr/>
+        </p:nvCxnSpPr>
+        <p:spPr bwMode="auto">
+          <a:xfrm flipH="1">
+            <a:off x="3234411" y="2095496"/>
+            <a:ext cx="26460" cy="4381500"/>
+          </a:xfrm>
+          <a:prstGeom prst="line">
+            <a:avLst/>
+          </a:prstGeom>
+          <a:solidFill>
+            <a:schemeClr val="accent1"/>
+          </a:solidFill>
+          <a:ln w="12700" cap="sq" cmpd="sng" algn="ctr">
+            <a:solidFill>
+              <a:srgbClr val="92D050"/>
+            </a:solidFill>
+            <a:prstDash val="solid"/>
+            <a:round/>
+            <a:headEnd type="none" w="sm" len="sm"/>
+            <a:tailEnd type="none" w="sm" len="sm"/>
+          </a:ln>
+          <a:effectLst/>
+        </p:spPr>
+      </p:cxnSp>
+      <p:sp>
+        <p:nvSpPr>
+          <p:cNvPr id="21" name="Oval 20">
+            <a:extLst>
+              <a:ext uri="{FF2B5EF4-FFF2-40B4-BE49-F238E27FC236}">
+                <a16:creationId xmlns:a16="http://schemas.microsoft.com/office/drawing/2014/main" id="{A8A0CF91-A2BD-4B73-BBC7-A37F6D62ED3D}"/>
+              </a:ext>
+            </a:extLst>
+          </p:cNvPr>
+          <p:cNvSpPr/>
+          <p:nvPr/>
+        </p:nvSpPr>
+        <p:spPr bwMode="auto">
+          <a:xfrm>
+            <a:off x="3231090" y="3355969"/>
+            <a:ext cx="45719" cy="45719"/>
+          </a:xfrm>
+          <a:prstGeom prst="ellipse">
+            <a:avLst/>
+          </a:prstGeom>
+          <a:solidFill>
+            <a:srgbClr val="FF0000"/>
+          </a:solidFill>
+          <a:ln w="12700" cap="sq" cmpd="sng" algn="ctr">
+            <a:solidFill>
+              <a:srgbClr val="FF0000"/>
+            </a:solidFill>
+            <a:prstDash val="solid"/>
+            <a:round/>
+            <a:headEnd type="none" w="sm" len="sm"/>
+            <a:tailEnd type="none" w="sm" len="sm"/>
+          </a:ln>
+          <a:effectLst/>
+        </p:spPr>
+        <p:txBody>
+          <a:bodyPr vert="horz" wrap="square" lIns="91440" tIns="45720" rIns="91440" bIns="45720" numCol="1" rtlCol="0" anchor="t" anchorCtr="0" compatLnSpc="1">
+            <a:prstTxWarp prst="textNoShape">
+              <a:avLst/>
+            </a:prstTxWarp>
+          </a:bodyPr>
+          <a:lstStyle/>
+          <a:p>
+            <a:pPr marL="0" marR="0" indent="0" algn="l" defTabSz="914400" rtl="0" eaLnBrk="1" fontAlgn="base" latinLnBrk="0" hangingPunct="1">
+              <a:lnSpc>
+                <a:spcPct val="100000"/>
+              </a:lnSpc>
+              <a:spcBef>
+                <a:spcPct val="0"/>
+              </a:spcBef>
+              <a:spcAft>
+                <a:spcPct val="0"/>
+              </a:spcAft>
+              <a:buClrTx/>
+              <a:buSzTx/>
+              <a:buFontTx/>
+              <a:buNone/>
+              <a:tabLst/>
+            </a:pPr>
+            <a:endParaRPr kumimoji="0" lang="en-ZA" sz="2400" b="0" i="0" u="none" strike="noStrike" cap="none" normalizeH="0" baseline="0">
+              <a:ln>
+                <a:noFill/>
+              </a:ln>
+              <a:solidFill>
+                <a:schemeClr val="tx1"/>
+              </a:solidFill>
+              <a:effectLst/>
+              <a:latin typeface="Times New Roman" pitchFamily="18" charset="0"/>
+            </a:endParaRPr>
+          </a:p>
+        </p:txBody>
+      </p:sp>
+      <p:cxnSp>
+        <p:nvCxnSpPr>
+          <p:cNvPr id="41" name="Straight Connector 40">
+            <a:extLst>
+              <a:ext uri="{FF2B5EF4-FFF2-40B4-BE49-F238E27FC236}">
+                <a16:creationId xmlns:a16="http://schemas.microsoft.com/office/drawing/2014/main" id="{EE7DA128-A2FA-4978-8AAD-C8A19C490643}"/>
+              </a:ext>
+            </a:extLst>
+          </p:cNvPr>
+          <p:cNvCxnSpPr>
+            <a:cxnSpLocks/>
+          </p:cNvCxnSpPr>
+          <p:nvPr/>
+        </p:nvCxnSpPr>
+        <p:spPr bwMode="auto">
+          <a:xfrm>
+            <a:off x="2889249" y="6379261"/>
+            <a:ext cx="3286126" cy="12384"/>
+          </a:xfrm>
+          <a:prstGeom prst="line">
+            <a:avLst/>
+          </a:prstGeom>
+          <a:solidFill>
+            <a:schemeClr val="accent1"/>
+          </a:solidFill>
+          <a:ln w="12700" cap="sq" cmpd="sng" algn="ctr">
+            <a:solidFill>
+              <a:srgbClr val="0070C0"/>
+            </a:solidFill>
+            <a:prstDash val="solid"/>
+            <a:round/>
+            <a:headEnd type="none" w="sm" len="sm"/>
+            <a:tailEnd type="none" w="sm" len="sm"/>
+          </a:ln>
+          <a:effectLst/>
+        </p:spPr>
+      </p:cxnSp>
+      <p:sp>
+        <p:nvSpPr>
+          <p:cNvPr id="31" name="Oval 30">
+            <a:extLst>
+              <a:ext uri="{FF2B5EF4-FFF2-40B4-BE49-F238E27FC236}">
+                <a16:creationId xmlns:a16="http://schemas.microsoft.com/office/drawing/2014/main" id="{1B85BCC7-7CC6-44AC-A223-20EB37983A08}"/>
+              </a:ext>
+            </a:extLst>
+          </p:cNvPr>
+          <p:cNvSpPr/>
+          <p:nvPr/>
+        </p:nvSpPr>
+        <p:spPr bwMode="auto">
+          <a:xfrm>
+            <a:off x="3209818" y="6360055"/>
+            <a:ext cx="45719" cy="45719"/>
+          </a:xfrm>
+          <a:prstGeom prst="ellipse">
+            <a:avLst/>
+          </a:prstGeom>
+          <a:solidFill>
+            <a:srgbClr val="FF0000"/>
+          </a:solidFill>
+          <a:ln w="12700" cap="sq" cmpd="sng" algn="ctr">
+            <a:solidFill>
+              <a:srgbClr val="FF0000"/>
+            </a:solidFill>
+            <a:prstDash val="solid"/>
+            <a:round/>
+            <a:headEnd type="none" w="sm" len="sm"/>
+            <a:tailEnd type="none" w="sm" len="sm"/>
+          </a:ln>
+          <a:effectLst/>
+        </p:spPr>
+        <p:txBody>
+          <a:bodyPr vert="horz" wrap="square" lIns="91440" tIns="45720" rIns="91440" bIns="45720" numCol="1" rtlCol="0" anchor="t" anchorCtr="0" compatLnSpc="1">
+            <a:prstTxWarp prst="textNoShape">
+              <a:avLst/>
+            </a:prstTxWarp>
+          </a:bodyPr>
+          <a:lstStyle/>
+          <a:p>
+            <a:pPr marL="0" marR="0" indent="0" algn="l" defTabSz="914400" rtl="0" eaLnBrk="1" fontAlgn="base" latinLnBrk="0" hangingPunct="1">
+              <a:lnSpc>
+                <a:spcPct val="100000"/>
+              </a:lnSpc>
+              <a:spcBef>
+                <a:spcPct val="0"/>
+              </a:spcBef>
+              <a:spcAft>
+                <a:spcPct val="0"/>
+              </a:spcAft>
+              <a:buClrTx/>
+              <a:buSzTx/>
+              <a:buFontTx/>
+              <a:buNone/>
+              <a:tabLst/>
+            </a:pPr>
+            <a:endParaRPr kumimoji="0" lang="en-ZA" sz="2400" b="0" i="0" u="none" strike="noStrike" cap="none" normalizeH="0" baseline="0">
+              <a:ln>
+                <a:noFill/>
+              </a:ln>
+              <a:solidFill>
+                <a:schemeClr val="tx1"/>
+              </a:solidFill>
+              <a:effectLst/>
+              <a:latin typeface="Times New Roman" pitchFamily="18" charset="0"/>
+            </a:endParaRPr>
+          </a:p>
+        </p:txBody>
+      </p:sp>
+      <p:sp>
+        <p:nvSpPr>
+          <p:cNvPr id="22" name="Oval 21">
+            <a:extLst>
+              <a:ext uri="{FF2B5EF4-FFF2-40B4-BE49-F238E27FC236}">
+                <a16:creationId xmlns:a16="http://schemas.microsoft.com/office/drawing/2014/main" id="{86D4E02C-964A-4BF0-9F6C-71C7E82F1915}"/>
+              </a:ext>
+            </a:extLst>
+          </p:cNvPr>
+          <p:cNvSpPr/>
+          <p:nvPr/>
+        </p:nvSpPr>
+        <p:spPr bwMode="auto">
+          <a:xfrm>
+            <a:off x="4602054" y="6366405"/>
+            <a:ext cx="45719" cy="45719"/>
+          </a:xfrm>
+          <a:prstGeom prst="ellipse">
+            <a:avLst/>
+          </a:prstGeom>
+          <a:solidFill>
+            <a:srgbClr val="FF0000"/>
+          </a:solidFill>
+          <a:ln w="12700" cap="sq" cmpd="sng" algn="ctr">
+            <a:solidFill>
+              <a:srgbClr val="FF0000"/>
+            </a:solidFill>
+            <a:prstDash val="solid"/>
+            <a:round/>
+            <a:headEnd type="none" w="sm" len="sm"/>
+            <a:tailEnd type="none" w="sm" len="sm"/>
+          </a:ln>
+          <a:effectLst/>
+        </p:spPr>
+        <p:txBody>
+          <a:bodyPr vert="horz" wrap="square" lIns="91440" tIns="45720" rIns="91440" bIns="45720" numCol="1" rtlCol="0" anchor="t" anchorCtr="0" compatLnSpc="1">
+            <a:prstTxWarp prst="textNoShape">
+              <a:avLst/>
+            </a:prstTxWarp>
+          </a:bodyPr>
+          <a:lstStyle/>
+          <a:p>
+            <a:pPr marL="0" marR="0" indent="0" algn="l" defTabSz="914400" rtl="0" eaLnBrk="1" fontAlgn="base" latinLnBrk="0" hangingPunct="1">
+              <a:lnSpc>
+                <a:spcPct val="100000"/>
+              </a:lnSpc>
+              <a:spcBef>
+                <a:spcPct val="0"/>
+              </a:spcBef>
+              <a:spcAft>
+                <a:spcPct val="0"/>
+              </a:spcAft>
+              <a:buClrTx/>
+              <a:buSzTx/>
+              <a:buFontTx/>
+              <a:buNone/>
+              <a:tabLst/>
+            </a:pPr>
+            <a:endParaRPr kumimoji="0" lang="en-ZA" sz="2400" b="0" i="0" u="none" strike="noStrike" cap="none" normalizeH="0" baseline="0">
+              <a:ln>
+                <a:noFill/>
+              </a:ln>
+              <a:solidFill>
+                <a:schemeClr val="tx1"/>
+              </a:solidFill>
+              <a:effectLst/>
+              <a:latin typeface="Times New Roman" pitchFamily="18" charset="0"/>
+            </a:endParaRPr>
+          </a:p>
+        </p:txBody>
+      </p:sp>
+      <p:pic>
+        <p:nvPicPr>
+          <p:cNvPr id="45" name="Picture 44">
+            <a:extLst>
+              <a:ext uri="{FF2B5EF4-FFF2-40B4-BE49-F238E27FC236}">
+                <a16:creationId xmlns:a16="http://schemas.microsoft.com/office/drawing/2014/main" id="{617E3869-2308-4766-B30B-87966A45D861}"/>
+              </a:ext>
+            </a:extLst>
+          </p:cNvPr>
+          <p:cNvPicPr>
+            <a:picLocks noChangeAspect="1"/>
+          </p:cNvPicPr>
+          <p:nvPr/>
+        </p:nvPicPr>
+        <p:blipFill rotWithShape="1">
+          <a:blip r:embed="rId5" cstate="print">
+            <a:extLst>
+              <a:ext uri="{28A0092B-C50C-407E-A947-70E740481C1C}">
+                <a14:useLocalDpi xmlns:a14="http://schemas.microsoft.com/office/drawing/2010/main" val="0"/>
+              </a:ext>
+            </a:extLst>
+          </a:blip>
+          <a:srcRect l="12396" t="13102" r="8591" b="10603"/>
+          <a:stretch/>
+        </p:blipFill>
+        <p:spPr>
+          <a:xfrm rot="16200000">
+            <a:off x="-128586" y="3690934"/>
+            <a:ext cx="4057650" cy="1514478"/>
+          </a:xfrm>
+          <a:prstGeom prst="rect">
+            <a:avLst/>
+          </a:prstGeom>
+        </p:spPr>
+      </p:pic>
     </p:spTree>
     <p:extLst>
       <p:ext uri="{BB962C8B-B14F-4D97-AF65-F5344CB8AC3E}">
@@ -6891,6 +7402,447 @@
   <p:clrMapOvr>
     <a:masterClrMapping/>
   </p:clrMapOvr>
+  <p:timing>
+    <p:tnLst>
+      <p:par>
+        <p:cTn id="1" dur="indefinite" restart="never" nodeType="tmRoot">
+          <p:childTnLst>
+            <p:seq concurrent="1" nextAc="seek">
+              <p:cTn id="2" dur="indefinite" nodeType="mainSeq">
+                <p:childTnLst>
+                  <p:par>
+                    <p:cTn id="3" fill="hold">
+                      <p:stCondLst>
+                        <p:cond delay="indefinite"/>
+                      </p:stCondLst>
+                      <p:childTnLst>
+                        <p:par>
+                          <p:cTn id="4" fill="hold">
+                            <p:stCondLst>
+                              <p:cond delay="0"/>
+                            </p:stCondLst>
+                            <p:childTnLst>
+                              <p:par>
+                                <p:cTn id="5" presetID="1" presetClass="entr" presetSubtype="0" fill="hold" nodeType="clickEffect">
+                                  <p:stCondLst>
+                                    <p:cond delay="0"/>
+                                  </p:stCondLst>
+                                  <p:childTnLst>
+                                    <p:set>
+                                      <p:cBhvr>
+                                        <p:cTn id="6" dur="1" fill="hold">
+                                          <p:stCondLst>
+                                            <p:cond delay="0"/>
+                                          </p:stCondLst>
+                                        </p:cTn>
+                                        <p:tgtEl>
+                                          <p:spTgt spid="37"/>
+                                        </p:tgtEl>
+                                        <p:attrNameLst>
+                                          <p:attrName>style.visibility</p:attrName>
+                                        </p:attrNameLst>
+                                      </p:cBhvr>
+                                      <p:to>
+                                        <p:strVal val="visible"/>
+                                      </p:to>
+                                    </p:set>
+                                  </p:childTnLst>
+                                </p:cTn>
+                              </p:par>
+                            </p:childTnLst>
+                          </p:cTn>
+                        </p:par>
+                      </p:childTnLst>
+                    </p:cTn>
+                  </p:par>
+                  <p:par>
+                    <p:cTn id="7" fill="hold">
+                      <p:stCondLst>
+                        <p:cond delay="indefinite"/>
+                      </p:stCondLst>
+                      <p:childTnLst>
+                        <p:par>
+                          <p:cTn id="8" fill="hold">
+                            <p:stCondLst>
+                              <p:cond delay="0"/>
+                            </p:stCondLst>
+                            <p:childTnLst>
+                              <p:par>
+                                <p:cTn id="9" presetID="1" presetClass="entr" presetSubtype="0" fill="hold" nodeType="clickEffect">
+                                  <p:stCondLst>
+                                    <p:cond delay="0"/>
+                                  </p:stCondLst>
+                                  <p:childTnLst>
+                                    <p:set>
+                                      <p:cBhvr>
+                                        <p:cTn id="10" dur="1" fill="hold">
+                                          <p:stCondLst>
+                                            <p:cond delay="0"/>
+                                          </p:stCondLst>
+                                        </p:cTn>
+                                        <p:tgtEl>
+                                          <p:spTgt spid="45"/>
+                                        </p:tgtEl>
+                                        <p:attrNameLst>
+                                          <p:attrName>style.visibility</p:attrName>
+                                        </p:attrNameLst>
+                                      </p:cBhvr>
+                                      <p:to>
+                                        <p:strVal val="visible"/>
+                                      </p:to>
+                                    </p:set>
+                                  </p:childTnLst>
+                                </p:cTn>
+                              </p:par>
+                            </p:childTnLst>
+                          </p:cTn>
+                        </p:par>
+                      </p:childTnLst>
+                    </p:cTn>
+                  </p:par>
+                  <p:par>
+                    <p:cTn id="11" fill="hold">
+                      <p:stCondLst>
+                        <p:cond delay="indefinite"/>
+                      </p:stCondLst>
+                      <p:childTnLst>
+                        <p:par>
+                          <p:cTn id="12" fill="hold">
+                            <p:stCondLst>
+                              <p:cond delay="0"/>
+                            </p:stCondLst>
+                            <p:childTnLst>
+                              <p:par>
+                                <p:cTn id="13" presetID="1" presetClass="entr" presetSubtype="0" fill="hold" nodeType="clickEffect">
+                                  <p:stCondLst>
+                                    <p:cond delay="0"/>
+                                  </p:stCondLst>
+                                  <p:childTnLst>
+                                    <p:set>
+                                      <p:cBhvr>
+                                        <p:cTn id="14" dur="1" fill="hold">
+                                          <p:stCondLst>
+                                            <p:cond delay="0"/>
+                                          </p:stCondLst>
+                                        </p:cTn>
+                                        <p:tgtEl>
+                                          <p:spTgt spid="12"/>
+                                        </p:tgtEl>
+                                        <p:attrNameLst>
+                                          <p:attrName>style.visibility</p:attrName>
+                                        </p:attrNameLst>
+                                      </p:cBhvr>
+                                      <p:to>
+                                        <p:strVal val="visible"/>
+                                      </p:to>
+                                    </p:set>
+                                  </p:childTnLst>
+                                </p:cTn>
+                              </p:par>
+                              <p:par>
+                                <p:cTn id="15" presetID="1" presetClass="entr" presetSubtype="0" fill="hold" nodeType="withEffect">
+                                  <p:stCondLst>
+                                    <p:cond delay="0"/>
+                                  </p:stCondLst>
+                                  <p:childTnLst>
+                                    <p:set>
+                                      <p:cBhvr>
+                                        <p:cTn id="16" dur="1" fill="hold">
+                                          <p:stCondLst>
+                                            <p:cond delay="0"/>
+                                          </p:stCondLst>
+                                        </p:cTn>
+                                        <p:tgtEl>
+                                          <p:spTgt spid="41"/>
+                                        </p:tgtEl>
+                                        <p:attrNameLst>
+                                          <p:attrName>style.visibility</p:attrName>
+                                        </p:attrNameLst>
+                                      </p:cBhvr>
+                                      <p:to>
+                                        <p:strVal val="visible"/>
+                                      </p:to>
+                                    </p:set>
+                                  </p:childTnLst>
+                                </p:cTn>
+                              </p:par>
+                            </p:childTnLst>
+                          </p:cTn>
+                        </p:par>
+                      </p:childTnLst>
+                    </p:cTn>
+                  </p:par>
+                  <p:par>
+                    <p:cTn id="17" fill="hold">
+                      <p:stCondLst>
+                        <p:cond delay="indefinite"/>
+                      </p:stCondLst>
+                      <p:childTnLst>
+                        <p:par>
+                          <p:cTn id="18" fill="hold">
+                            <p:stCondLst>
+                              <p:cond delay="0"/>
+                            </p:stCondLst>
+                            <p:childTnLst>
+                              <p:par>
+                                <p:cTn id="19" presetID="1" presetClass="entr" presetSubtype="0" fill="hold" nodeType="clickEffect">
+                                  <p:stCondLst>
+                                    <p:cond delay="0"/>
+                                  </p:stCondLst>
+                                  <p:childTnLst>
+                                    <p:set>
+                                      <p:cBhvr>
+                                        <p:cTn id="20" dur="1" fill="hold">
+                                          <p:stCondLst>
+                                            <p:cond delay="0"/>
+                                          </p:stCondLst>
+                                        </p:cTn>
+                                        <p:tgtEl>
+                                          <p:spTgt spid="34"/>
+                                        </p:tgtEl>
+                                        <p:attrNameLst>
+                                          <p:attrName>style.visibility</p:attrName>
+                                        </p:attrNameLst>
+                                      </p:cBhvr>
+                                      <p:to>
+                                        <p:strVal val="visible"/>
+                                      </p:to>
+                                    </p:set>
+                                  </p:childTnLst>
+                                </p:cTn>
+                              </p:par>
+                              <p:par>
+                                <p:cTn id="21" presetID="1" presetClass="entr" presetSubtype="0" fill="hold" nodeType="withEffect">
+                                  <p:stCondLst>
+                                    <p:cond delay="0"/>
+                                  </p:stCondLst>
+                                  <p:childTnLst>
+                                    <p:set>
+                                      <p:cBhvr>
+                                        <p:cTn id="22" dur="1" fill="hold">
+                                          <p:stCondLst>
+                                            <p:cond delay="0"/>
+                                          </p:stCondLst>
+                                        </p:cTn>
+                                        <p:tgtEl>
+                                          <p:spTgt spid="17"/>
+                                        </p:tgtEl>
+                                        <p:attrNameLst>
+                                          <p:attrName>style.visibility</p:attrName>
+                                        </p:attrNameLst>
+                                      </p:cBhvr>
+                                      <p:to>
+                                        <p:strVal val="visible"/>
+                                      </p:to>
+                                    </p:set>
+                                  </p:childTnLst>
+                                </p:cTn>
+                              </p:par>
+                            </p:childTnLst>
+                          </p:cTn>
+                        </p:par>
+                      </p:childTnLst>
+                    </p:cTn>
+                  </p:par>
+                  <p:par>
+                    <p:cTn id="23" fill="hold">
+                      <p:stCondLst>
+                        <p:cond delay="indefinite"/>
+                      </p:stCondLst>
+                      <p:childTnLst>
+                        <p:par>
+                          <p:cTn id="24" fill="hold">
+                            <p:stCondLst>
+                              <p:cond delay="0"/>
+                            </p:stCondLst>
+                            <p:childTnLst>
+                              <p:par>
+                                <p:cTn id="25" presetID="1" presetClass="entr" presetSubtype="0" fill="hold" grpId="0" nodeType="clickEffect">
+                                  <p:stCondLst>
+                                    <p:cond delay="0"/>
+                                  </p:stCondLst>
+                                  <p:childTnLst>
+                                    <p:set>
+                                      <p:cBhvr>
+                                        <p:cTn id="26" dur="1" fill="hold">
+                                          <p:stCondLst>
+                                            <p:cond delay="0"/>
+                                          </p:stCondLst>
+                                        </p:cTn>
+                                        <p:tgtEl>
+                                          <p:spTgt spid="21"/>
+                                        </p:tgtEl>
+                                        <p:attrNameLst>
+                                          <p:attrName>style.visibility</p:attrName>
+                                        </p:attrNameLst>
+                                      </p:cBhvr>
+                                      <p:to>
+                                        <p:strVal val="visible"/>
+                                      </p:to>
+                                    </p:set>
+                                  </p:childTnLst>
+                                </p:cTn>
+                              </p:par>
+                              <p:par>
+                                <p:cTn id="27" presetID="1" presetClass="entr" presetSubtype="0" fill="hold" grpId="0" nodeType="withEffect">
+                                  <p:stCondLst>
+                                    <p:cond delay="0"/>
+                                  </p:stCondLst>
+                                  <p:childTnLst>
+                                    <p:set>
+                                      <p:cBhvr>
+                                        <p:cTn id="28" dur="1" fill="hold">
+                                          <p:stCondLst>
+                                            <p:cond delay="0"/>
+                                          </p:stCondLst>
+                                        </p:cTn>
+                                        <p:tgtEl>
+                                          <p:spTgt spid="22"/>
+                                        </p:tgtEl>
+                                        <p:attrNameLst>
+                                          <p:attrName>style.visibility</p:attrName>
+                                        </p:attrNameLst>
+                                      </p:cBhvr>
+                                      <p:to>
+                                        <p:strVal val="visible"/>
+                                      </p:to>
+                                    </p:set>
+                                  </p:childTnLst>
+                                </p:cTn>
+                              </p:par>
+                              <p:par>
+                                <p:cTn id="29" presetID="1" presetClass="entr" presetSubtype="0" fill="hold" grpId="0" nodeType="withEffect">
+                                  <p:stCondLst>
+                                    <p:cond delay="0"/>
+                                  </p:stCondLst>
+                                  <p:childTnLst>
+                                    <p:set>
+                                      <p:cBhvr>
+                                        <p:cTn id="30" dur="1" fill="hold">
+                                          <p:stCondLst>
+                                            <p:cond delay="0"/>
+                                          </p:stCondLst>
+                                        </p:cTn>
+                                        <p:tgtEl>
+                                          <p:spTgt spid="31"/>
+                                        </p:tgtEl>
+                                        <p:attrNameLst>
+                                          <p:attrName>style.visibility</p:attrName>
+                                        </p:attrNameLst>
+                                      </p:cBhvr>
+                                      <p:to>
+                                        <p:strVal val="visible"/>
+                                      </p:to>
+                                    </p:set>
+                                  </p:childTnLst>
+                                </p:cTn>
+                              </p:par>
+                              <p:par>
+                                <p:cTn id="31" presetID="1" presetClass="entr" presetSubtype="0" fill="hold" grpId="0" nodeType="withEffect">
+                                  <p:stCondLst>
+                                    <p:cond delay="0"/>
+                                  </p:stCondLst>
+                                  <p:childTnLst>
+                                    <p:set>
+                                      <p:cBhvr>
+                                        <p:cTn id="32" dur="1" fill="hold">
+                                          <p:stCondLst>
+                                            <p:cond delay="0"/>
+                                          </p:stCondLst>
+                                        </p:cTn>
+                                        <p:tgtEl>
+                                          <p:spTgt spid="18"/>
+                                        </p:tgtEl>
+                                        <p:attrNameLst>
+                                          <p:attrName>style.visibility</p:attrName>
+                                        </p:attrNameLst>
+                                      </p:cBhvr>
+                                      <p:to>
+                                        <p:strVal val="visible"/>
+                                      </p:to>
+                                    </p:set>
+                                  </p:childTnLst>
+                                </p:cTn>
+                              </p:par>
+                            </p:childTnLst>
+                          </p:cTn>
+                        </p:par>
+                      </p:childTnLst>
+                    </p:cTn>
+                  </p:par>
+                  <p:par>
+                    <p:cTn id="33" fill="hold">
+                      <p:stCondLst>
+                        <p:cond delay="indefinite"/>
+                      </p:stCondLst>
+                      <p:childTnLst>
+                        <p:par>
+                          <p:cTn id="34" fill="hold">
+                            <p:stCondLst>
+                              <p:cond delay="0"/>
+                            </p:stCondLst>
+                            <p:childTnLst>
+                              <p:par>
+                                <p:cTn id="35" presetID="1" presetClass="entr" presetSubtype="0" fill="hold" nodeType="clickEffect">
+                                  <p:stCondLst>
+                                    <p:cond delay="0"/>
+                                  </p:stCondLst>
+                                  <p:childTnLst>
+                                    <p:set>
+                                      <p:cBhvr>
+                                        <p:cTn id="36" dur="1" fill="hold">
+                                          <p:stCondLst>
+                                            <p:cond delay="0"/>
+                                          </p:stCondLst>
+                                        </p:cTn>
+                                        <p:tgtEl>
+                                          <p:spTgt spid="6"/>
+                                        </p:tgtEl>
+                                        <p:attrNameLst>
+                                          <p:attrName>style.visibility</p:attrName>
+                                        </p:attrNameLst>
+                                      </p:cBhvr>
+                                      <p:to>
+                                        <p:strVal val="visible"/>
+                                      </p:to>
+                                    </p:set>
+                                  </p:childTnLst>
+                                </p:cTn>
+                              </p:par>
+                            </p:childTnLst>
+                          </p:cTn>
+                        </p:par>
+                      </p:childTnLst>
+                    </p:cTn>
+                  </p:par>
+                </p:childTnLst>
+              </p:cTn>
+              <p:prevCondLst>
+                <p:cond evt="onPrev" delay="0">
+                  <p:tgtEl>
+                    <p:sldTgt/>
+                  </p:tgtEl>
+                </p:cond>
+              </p:prevCondLst>
+              <p:nextCondLst>
+                <p:cond evt="onNext" delay="0">
+                  <p:tgtEl>
+                    <p:sldTgt/>
+                  </p:tgtEl>
+                </p:cond>
+              </p:nextCondLst>
+            </p:seq>
+          </p:childTnLst>
+        </p:cTn>
+      </p:par>
+    </p:tnLst>
+    <p:bldLst>
+      <p:bldP spid="18" grpId="0" animBg="1"/>
+      <p:bldP spid="21" grpId="0" animBg="1"/>
+      <p:bldP spid="31" grpId="0" animBg="1"/>
+      <p:bldP spid="22" grpId="0" animBg="1"/>
+    </p:bldLst>
+  </p:timing>
 </p:sld>
 </file>
 
@@ -6913,7 +7865,13 @@
       </p:grpSpPr>
       <p:sp>
         <p:nvSpPr>
-          <p:cNvPr id="2" name="Title 1"/>
+          <p:cNvPr id="2" name="Title 1">
+            <a:extLst>
+              <a:ext uri="{FF2B5EF4-FFF2-40B4-BE49-F238E27FC236}">
+                <a16:creationId xmlns:a16="http://schemas.microsoft.com/office/drawing/2014/main" id="{0900A91B-BAC2-44E1-A791-90B33A4C963B}"/>
+              </a:ext>
+            </a:extLst>
+          </p:cNvPr>
           <p:cNvSpPr>
             <a:spLocks noGrp="1"/>
           </p:cNvSpPr>
@@ -6926,17 +7884,182 @@
           <a:bodyPr/>
           <a:lstStyle/>
           <a:p>
-            <a:r>
-              <a:rPr lang="en-US" dirty="0"/>
-              <a:t>Introduction</a:t>
-            </a:r>
-            <a:endParaRPr lang="en-GB" dirty="0"/>
+            <a:endParaRPr lang="en-ZA"/>
           </a:p>
         </p:txBody>
       </p:sp>
       <p:sp>
         <p:nvSpPr>
-          <p:cNvPr id="3" name="Content Placeholder 2"/>
+          <p:cNvPr id="4" name="Slide Number Placeholder 3">
+            <a:extLst>
+              <a:ext uri="{FF2B5EF4-FFF2-40B4-BE49-F238E27FC236}">
+                <a16:creationId xmlns:a16="http://schemas.microsoft.com/office/drawing/2014/main" id="{CB887F69-566C-4B98-A607-DA1A1021298F}"/>
+              </a:ext>
+            </a:extLst>
+          </p:cNvPr>
+          <p:cNvSpPr>
+            <a:spLocks noGrp="1"/>
+          </p:cNvSpPr>
+          <p:nvPr>
+            <p:ph type="sldNum" sz="quarter" idx="10"/>
+          </p:nvPr>
+        </p:nvSpPr>
+        <p:spPr/>
+        <p:txBody>
+          <a:bodyPr/>
+          <a:lstStyle/>
+          <a:p>
+            <a:pPr>
+              <a:defRPr/>
+            </a:pPr>
+            <a:fld id="{A27591B5-593E-49C1-8C2D-4B5CC8495990}" type="slidenum">
+              <a:rPr lang="en-US" smtClean="0"/>
+              <a:pPr>
+                <a:defRPr/>
+              </a:pPr>
+              <a:t>7</a:t>
+            </a:fld>
+            <a:endParaRPr lang="en-US" dirty="0"/>
+          </a:p>
+        </p:txBody>
+      </p:sp>
+      <p:pic>
+        <p:nvPicPr>
+          <p:cNvPr id="8" name="Picture 7">
+            <a:extLst>
+              <a:ext uri="{FF2B5EF4-FFF2-40B4-BE49-F238E27FC236}">
+                <a16:creationId xmlns:a16="http://schemas.microsoft.com/office/drawing/2014/main" id="{ED303DAB-881A-4740-A11C-FF58B8C183BD}"/>
+              </a:ext>
+            </a:extLst>
+          </p:cNvPr>
+          <p:cNvPicPr>
+            <a:picLocks noChangeAspect="1"/>
+          </p:cNvPicPr>
+          <p:nvPr/>
+        </p:nvPicPr>
+        <p:blipFill>
+          <a:blip r:embed="rId2">
+            <a:extLst>
+              <a:ext uri="{28A0092B-C50C-407E-A947-70E740481C1C}">
+                <a14:useLocalDpi xmlns:a14="http://schemas.microsoft.com/office/drawing/2010/main" val="0"/>
+              </a:ext>
+            </a:extLst>
+          </a:blip>
+          <a:stretch>
+            <a:fillRect/>
+          </a:stretch>
+        </p:blipFill>
+        <p:spPr>
+          <a:xfrm>
+            <a:off x="1828800" y="2034748"/>
+            <a:ext cx="2825488" cy="4442252"/>
+          </a:xfrm>
+          <a:prstGeom prst="rect">
+            <a:avLst/>
+          </a:prstGeom>
+        </p:spPr>
+      </p:pic>
+      <p:sp>
+        <p:nvSpPr>
+          <p:cNvPr id="6" name="Rectangle 5">
+            <a:extLst>
+              <a:ext uri="{FF2B5EF4-FFF2-40B4-BE49-F238E27FC236}">
+                <a16:creationId xmlns:a16="http://schemas.microsoft.com/office/drawing/2014/main" id="{CDD6BE5B-404A-4062-B371-CF7E32C70DD2}"/>
+              </a:ext>
+            </a:extLst>
+          </p:cNvPr>
+          <p:cNvSpPr/>
+          <p:nvPr/>
+        </p:nvSpPr>
+        <p:spPr>
+          <a:xfrm>
+            <a:off x="847631" y="1203751"/>
+            <a:ext cx="6096000" cy="830997"/>
+          </a:xfrm>
+          <a:prstGeom prst="rect">
+            <a:avLst/>
+          </a:prstGeom>
+        </p:spPr>
+        <p:txBody>
+          <a:bodyPr>
+            <a:spAutoFit/>
+          </a:bodyPr>
+          <a:lstStyle/>
+          <a:p>
+            <a:r>
+              <a:rPr lang="en-ZA" dirty="0"/>
+              <a:t>Once this is done the bubble locations can be found and processed.</a:t>
+            </a:r>
+          </a:p>
+        </p:txBody>
+      </p:sp>
+      <p:pic>
+        <p:nvPicPr>
+          <p:cNvPr id="9" name="Content Placeholder 4">
+            <a:extLst>
+              <a:ext uri="{FF2B5EF4-FFF2-40B4-BE49-F238E27FC236}">
+                <a16:creationId xmlns:a16="http://schemas.microsoft.com/office/drawing/2014/main" id="{F50276F8-DD58-47E8-A125-0A05867F915C}"/>
+              </a:ext>
+            </a:extLst>
+          </p:cNvPr>
+          <p:cNvPicPr>
+            <a:picLocks noChangeAspect="1"/>
+          </p:cNvPicPr>
+          <p:nvPr/>
+        </p:nvPicPr>
+        <p:blipFill rotWithShape="1">
+          <a:blip r:embed="rId3">
+            <a:extLst>
+              <a:ext uri="{28A0092B-C50C-407E-A947-70E740481C1C}">
+                <a14:useLocalDpi xmlns:a14="http://schemas.microsoft.com/office/drawing/2010/main" val="0"/>
+              </a:ext>
+            </a:extLst>
+          </a:blip>
+          <a:srcRect l="79282" t="7597" r="4243" b="66960"/>
+          <a:stretch/>
+        </p:blipFill>
+        <p:spPr bwMode="auto">
+          <a:xfrm>
+            <a:off x="6844713" y="2347354"/>
+            <a:ext cx="3910819" cy="3972951"/>
+          </a:xfrm>
+          <a:prstGeom prst="rect">
+            <a:avLst/>
+          </a:prstGeom>
+          <a:noFill/>
+          <a:ln>
+            <a:noFill/>
+          </a:ln>
+          <a:extLst>
+            <a:ext uri="{909E8E84-426E-40DD-AFC4-6F175D3DCCD1}">
+              <a14:hiddenFill xmlns:a14="http://schemas.microsoft.com/office/drawing/2010/main">
+                <a:solidFill>
+                  <a:srgbClr val="FFFFFF"/>
+                </a:solidFill>
+              </a14:hiddenFill>
+            </a:ext>
+            <a:ext uri="{91240B29-F687-4F45-9708-019B960494DF}">
+              <a14:hiddenLine xmlns:a14="http://schemas.microsoft.com/office/drawing/2010/main" w="9525">
+                <a:solidFill>
+                  <a:srgbClr val="000000"/>
+                </a:solidFill>
+                <a:miter lim="800000"/>
+                <a:headEnd/>
+                <a:tailEnd/>
+              </a14:hiddenLine>
+            </a:ext>
+          </a:extLst>
+        </p:spPr>
+      </p:pic>
+      <p:sp>
+        <p:nvSpPr>
+          <p:cNvPr id="11" name="Content Placeholder 10">
+            <a:extLst>
+              <a:ext uri="{FF2B5EF4-FFF2-40B4-BE49-F238E27FC236}">
+                <a16:creationId xmlns:a16="http://schemas.microsoft.com/office/drawing/2014/main" id="{82A21995-C246-430F-A665-07BCDEB35DFC}"/>
+              </a:ext>
+            </a:extLst>
+          </p:cNvPr>
           <p:cNvSpPr>
             <a:spLocks noGrp="1"/>
           </p:cNvSpPr>
@@ -6949,123 +8072,14 @@
           <a:bodyPr/>
           <a:lstStyle/>
           <a:p>
-            <a:r>
-              <a:rPr lang="en-ZA" dirty="0"/>
-              <a:t>The incipient motion, and thus also the erosion of shells and shell fragments, differs from that of equivalent sized sand particles</a:t>
-            </a:r>
-          </a:p>
-          <a:p>
-            <a:r>
-              <a:rPr lang="en-ZA" dirty="0"/>
-              <a:t>Only a small cross-sectional area of a shell is exposed to the horizontal direction of the flow making shells difficult to erode</a:t>
-            </a:r>
-          </a:p>
-          <a:p>
-            <a:r>
-              <a:rPr lang="en-GB" dirty="0"/>
-              <a:t>They have low </a:t>
-            </a:r>
-            <a:r>
-              <a:rPr lang="en-ZA" dirty="0"/>
-              <a:t>settling velocities due to their large cross-sectional area:</a:t>
-            </a:r>
-          </a:p>
-          <a:p>
-            <a:pPr lvl="1"/>
-            <a:r>
-              <a:rPr lang="en-ZA" dirty="0"/>
-              <a:t>This implies that shells are mostly visible on top of the sand</a:t>
-            </a:r>
-          </a:p>
-          <a:p>
-            <a:pPr lvl="1"/>
-            <a:r>
-              <a:rPr lang="en-ZA" dirty="0"/>
-              <a:t>consequently also shielding the finer, more easily erodible sediment such as sand</a:t>
-            </a:r>
-          </a:p>
-          <a:p>
-            <a:pPr marL="0" indent="0">
-              <a:buNone/>
-            </a:pPr>
-            <a:endParaRPr lang="en-GB" dirty="0"/>
+            <a:endParaRPr lang="en-ZA" dirty="0"/>
           </a:p>
         </p:txBody>
       </p:sp>
-      <p:sp>
-        <p:nvSpPr>
-          <p:cNvPr id="4" name="Slide Number Placeholder 3"/>
-          <p:cNvSpPr>
-            <a:spLocks noGrp="1"/>
-          </p:cNvSpPr>
-          <p:nvPr>
-            <p:ph type="sldNum" sz="quarter" idx="10"/>
-          </p:nvPr>
-        </p:nvSpPr>
-        <p:spPr/>
-        <p:txBody>
-          <a:bodyPr/>
-          <a:lstStyle/>
-          <a:p>
-            <a:pPr>
-              <a:defRPr/>
-            </a:pPr>
-            <a:fld id="{A27591B5-593E-49C1-8C2D-4B5CC8495990}" type="slidenum">
-              <a:rPr lang="en-US" smtClean="0"/>
-              <a:pPr>
-                <a:defRPr/>
-              </a:pPr>
-              <a:t>7</a:t>
-            </a:fld>
-            <a:endParaRPr lang="en-US" dirty="0"/>
-          </a:p>
-        </p:txBody>
-      </p:sp>
-      <p:pic>
-        <p:nvPicPr>
-          <p:cNvPr id="1026" name="Picture 2" descr="Shells, Beach, White, Waterfront, Nature, Sea"/>
-          <p:cNvPicPr>
-            <a:picLocks noChangeAspect="1" noChangeArrowheads="1"/>
-          </p:cNvPicPr>
-          <p:nvPr/>
-        </p:nvPicPr>
-        <p:blipFill>
-          <a:blip r:embed="rId2" cstate="screen">
-            <a:extLst>
-              <a:ext uri="{28A0092B-C50C-407E-A947-70E740481C1C}">
-                <a14:useLocalDpi xmlns:a14="http://schemas.microsoft.com/office/drawing/2010/main"/>
-              </a:ext>
-            </a:extLst>
-          </a:blip>
-          <a:srcRect/>
-          <a:stretch>
-            <a:fillRect/>
-          </a:stretch>
-        </p:blipFill>
-        <p:spPr bwMode="auto">
-          <a:xfrm>
-            <a:off x="8480981" y="5165407"/>
-            <a:ext cx="2043124" cy="1532343"/>
-          </a:xfrm>
-          <a:prstGeom prst="rect">
-            <a:avLst/>
-          </a:prstGeom>
-          <a:noFill/>
-          <a:extLst>
-            <a:ext uri="{909E8E84-426E-40DD-AFC4-6F175D3DCCD1}">
-              <a14:hiddenFill xmlns:a14="http://schemas.microsoft.com/office/drawing/2010/main">
-                <a:solidFill>
-                  <a:srgbClr val="FFFFFF"/>
-                </a:solidFill>
-              </a14:hiddenFill>
-            </a:ext>
-          </a:extLst>
-        </p:spPr>
-      </p:pic>
     </p:spTree>
     <p:extLst>
       <p:ext uri="{BB962C8B-B14F-4D97-AF65-F5344CB8AC3E}">
-        <p14:creationId xmlns:p14="http://schemas.microsoft.com/office/powerpoint/2010/main" val="3343450410"/>
+        <p14:creationId xmlns:p14="http://schemas.microsoft.com/office/powerpoint/2010/main" val="339862086"/>
       </p:ext>
     </p:extLst>
   </p:cSld>
@@ -7084,9 +8098,6 @@
                     <p:cTn id="3" fill="hold">
                       <p:stCondLst>
                         <p:cond delay="indefinite"/>
-                        <p:cond evt="onBegin" delay="0">
-                          <p:tn val="2"/>
-                        </p:cond>
                       </p:stCondLst>
                       <p:childTnLst>
                         <p:par>
@@ -7096,7 +8107,7 @@
                             </p:stCondLst>
                             <p:childTnLst>
                               <p:par>
-                                <p:cTn id="5" presetID="1" presetClass="entr" presetSubtype="0" fill="hold" nodeType="withEffect">
+                                <p:cTn id="5" presetID="1" presetClass="entr" presetSubtype="0" fill="hold" nodeType="clickEffect">
                                   <p:stCondLst>
                                     <p:cond delay="0"/>
                                   </p:stCondLst>
@@ -7109,7 +8120,52 @@
                                           </p:stCondLst>
                                         </p:cTn>
                                         <p:tgtEl>
-                                          <p:spTgt spid="1026"/>
+                                          <p:spTgt spid="8"/>
+                                        </p:tgtEl>
+                                        <p:attrNameLst>
+                                          <p:attrName>style.visibility</p:attrName>
+                                        </p:attrNameLst>
+                                      </p:cBhvr>
+                                      <p:to>
+                                        <p:strVal val="visible"/>
+                                      </p:to>
+                                    </p:set>
+                                  </p:childTnLst>
+                                </p:cTn>
+                              </p:par>
+                            </p:childTnLst>
+                          </p:cTn>
+                        </p:par>
+                      </p:childTnLst>
+                    </p:cTn>
+                  </p:par>
+                  <p:par>
+                    <p:cTn id="7" fill="hold">
+                      <p:stCondLst>
+                        <p:cond delay="indefinite"/>
+                      </p:stCondLst>
+                      <p:childTnLst>
+                        <p:par>
+                          <p:cTn id="8" fill="hold">
+                            <p:stCondLst>
+                              <p:cond delay="0"/>
+                            </p:stCondLst>
+                            <p:childTnLst>
+                              <p:par>
+                                <p:cTn id="9" presetID="1" presetClass="entr" presetSubtype="0" fill="hold" nodeType="clickEffect">
+                                  <p:stCondLst>
+                                    <p:cond delay="0"/>
+                                  </p:stCondLst>
+                                  <p:childTnLst>
+                                    <p:set>
+                                      <p:cBhvr>
+                                        <p:cTn id="10" dur="1" fill="hold">
+                                          <p:stCondLst>
+                                            <p:cond delay="0"/>
+                                          </p:stCondLst>
+                                        </p:cTn>
+                                        <p:tgtEl>
+                                          <p:spTgt spid="9"/>
                                         </p:tgtEl>
                                         <p:attrNameLst>
                                           <p:attrName>style.visibility</p:attrName>

</xml_diff>

<commit_message>
The first oral draft is now completed.
</commit_message>
<xml_diff>
--- a/OralExamination/SkripsieOral_APSmit.pptx
+++ b/OralExamination/SkripsieOral_APSmit.pptx
@@ -5,10 +5,10 @@
     <p:sldMasterId id="2147483648" r:id="rId1"/>
   </p:sldMasterIdLst>
   <p:notesMasterIdLst>
-    <p:notesMasterId r:id="rId14"/>
+    <p:notesMasterId r:id="rId15"/>
   </p:notesMasterIdLst>
   <p:handoutMasterIdLst>
-    <p:handoutMasterId r:id="rId15"/>
+    <p:handoutMasterId r:id="rId16"/>
   </p:handoutMasterIdLst>
   <p:sldIdLst>
     <p:sldId id="655" r:id="rId2"/>
@@ -22,12 +22,13 @@
     <p:sldId id="685" r:id="rId10"/>
     <p:sldId id="686" r:id="rId11"/>
     <p:sldId id="687" r:id="rId12"/>
-    <p:sldId id="690" r:id="rId13"/>
+    <p:sldId id="692" r:id="rId13"/>
+    <p:sldId id="690" r:id="rId14"/>
   </p:sldIdLst>
   <p:sldSz cx="12192000" cy="6858000"/>
   <p:notesSz cx="7315200" cy="9601200"/>
   <p:custDataLst>
-    <p:tags r:id="rId16"/>
+    <p:tags r:id="rId17"/>
   </p:custDataLst>
   <p:defaultTextStyle>
     <a:defPPr>
@@ -1560,6 +1561,96 @@
     <p:extLst>
       <p:ext uri="{BB962C8B-B14F-4D97-AF65-F5344CB8AC3E}">
         <p14:creationId xmlns:p14="http://schemas.microsoft.com/office/powerpoint/2010/main" val="503715633"/>
+      </p:ext>
+    </p:extLst>
+  </p:cSld>
+  <p:clrMapOvr>
+    <a:masterClrMapping/>
+  </p:clrMapOvr>
+</p:notes>
+</file>
+
+<file path=ppt/notesSlides/notesSlide8.xml><?xml version="1.0" encoding="utf-8"?>
+<p:notes xmlns:a="http://schemas.openxmlformats.org/drawingml/2006/main" xmlns:r="http://schemas.openxmlformats.org/officeDocument/2006/relationships" xmlns:p="http://schemas.openxmlformats.org/presentationml/2006/main">
+  <p:cSld>
+    <p:spTree>
+      <p:nvGrpSpPr>
+        <p:cNvPr id="1" name=""/>
+        <p:cNvGrpSpPr/>
+        <p:nvPr/>
+      </p:nvGrpSpPr>
+      <p:grpSpPr>
+        <a:xfrm>
+          <a:off x="0" y="0"/>
+          <a:ext cx="0" cy="0"/>
+          <a:chOff x="0" y="0"/>
+          <a:chExt cx="0" cy="0"/>
+        </a:xfrm>
+      </p:grpSpPr>
+      <p:sp>
+        <p:nvSpPr>
+          <p:cNvPr id="2" name="Slide Image Placeholder 1"/>
+          <p:cNvSpPr>
+            <a:spLocks noGrp="1" noRot="1" noChangeAspect="1"/>
+          </p:cNvSpPr>
+          <p:nvPr>
+            <p:ph type="sldImg"/>
+          </p:nvPr>
+        </p:nvSpPr>
+        <p:spPr/>
+      </p:sp>
+      <p:sp>
+        <p:nvSpPr>
+          <p:cNvPr id="3" name="Notes Placeholder 2"/>
+          <p:cNvSpPr>
+            <a:spLocks noGrp="1"/>
+          </p:cNvSpPr>
+          <p:nvPr>
+            <p:ph type="body" idx="1"/>
+          </p:nvPr>
+        </p:nvSpPr>
+        <p:spPr/>
+        <p:txBody>
+          <a:bodyPr/>
+          <a:lstStyle/>
+          <a:p>
+            <a:endParaRPr lang="en-ZA" dirty="0"/>
+          </a:p>
+        </p:txBody>
+      </p:sp>
+      <p:sp>
+        <p:nvSpPr>
+          <p:cNvPr id="4" name="Slide Number Placeholder 3"/>
+          <p:cNvSpPr>
+            <a:spLocks noGrp="1"/>
+          </p:cNvSpPr>
+          <p:nvPr>
+            <p:ph type="sldNum" sz="quarter" idx="10"/>
+          </p:nvPr>
+        </p:nvSpPr>
+        <p:spPr/>
+        <p:txBody>
+          <a:bodyPr/>
+          <a:lstStyle/>
+          <a:p>
+            <a:pPr>
+              <a:defRPr/>
+            </a:pPr>
+            <a:fld id="{2AABE78A-E99E-4C1C-B170-1B5F1DA6AE54}" type="slidenum">
+              <a:rPr lang="en-US" smtClean="0"/>
+              <a:pPr>
+                <a:defRPr/>
+              </a:pPr>
+              <a:t>11</a:t>
+            </a:fld>
+            <a:endParaRPr lang="en-US" dirty="0"/>
+          </a:p>
+        </p:txBody>
+      </p:sp>
+    </p:spTree>
+    <p:extLst>
+      <p:ext uri="{BB962C8B-B14F-4D97-AF65-F5344CB8AC3E}">
+        <p14:creationId xmlns:p14="http://schemas.microsoft.com/office/powerpoint/2010/main" val="3683827040"/>
       </p:ext>
     </p:extLst>
   </p:cSld>
@@ -6270,34 +6361,6 @@
       </p:sp>
       <p:sp>
         <p:nvSpPr>
-          <p:cNvPr id="3" name="Content Placeholder 2">
-            <a:extLst>
-              <a:ext uri="{FF2B5EF4-FFF2-40B4-BE49-F238E27FC236}">
-                <a16:creationId xmlns:a16="http://schemas.microsoft.com/office/drawing/2014/main" id="{0E056701-1D03-4C14-93F1-2C7D4F26D210}"/>
-              </a:ext>
-            </a:extLst>
-          </p:cNvPr>
-          <p:cNvSpPr>
-            <a:spLocks noGrp="1"/>
-          </p:cNvSpPr>
-          <p:nvPr>
-            <p:ph idx="1"/>
-          </p:nvPr>
-        </p:nvSpPr>
-        <p:spPr/>
-        <p:txBody>
-          <a:bodyPr/>
-          <a:lstStyle/>
-          <a:p>
-            <a:r>
-              <a:rPr lang="en-ZA" dirty="0"/>
-              <a:t>k</a:t>
-            </a:r>
-          </a:p>
-        </p:txBody>
-      </p:sp>
-      <p:sp>
-        <p:nvSpPr>
           <p:cNvPr id="4" name="Slide Number Placeholder 3">
             <a:extLst>
               <a:ext uri="{FF2B5EF4-FFF2-40B4-BE49-F238E27FC236}">
@@ -6331,6 +6394,76 @@
           </a:p>
         </p:txBody>
       </p:sp>
+      <p:pic>
+        <p:nvPicPr>
+          <p:cNvPr id="14" name="Content Placeholder 13">
+            <a:extLst>
+              <a:ext uri="{FF2B5EF4-FFF2-40B4-BE49-F238E27FC236}">
+                <a16:creationId xmlns:a16="http://schemas.microsoft.com/office/drawing/2014/main" id="{01959AA6-403D-4F83-AE3A-0CDB9297E10C}"/>
+              </a:ext>
+            </a:extLst>
+          </p:cNvPr>
+          <p:cNvPicPr>
+            <a:picLocks noGrp="1" noChangeAspect="1"/>
+          </p:cNvPicPr>
+          <p:nvPr>
+            <p:ph idx="1"/>
+          </p:nvPr>
+        </p:nvPicPr>
+        <p:blipFill>
+          <a:blip r:embed="rId3">
+            <a:extLst>
+              <a:ext uri="{28A0092B-C50C-407E-A947-70E740481C1C}">
+                <a14:useLocalDpi xmlns:a14="http://schemas.microsoft.com/office/drawing/2010/main" val="0"/>
+              </a:ext>
+            </a:extLst>
+          </a:blip>
+          <a:stretch>
+            <a:fillRect/>
+          </a:stretch>
+        </p:blipFill>
+        <p:spPr>
+          <a:xfrm>
+            <a:off x="4996016" y="2365098"/>
+            <a:ext cx="5963107" cy="2753002"/>
+          </a:xfrm>
+        </p:spPr>
+      </p:pic>
+      <p:pic>
+        <p:nvPicPr>
+          <p:cNvPr id="15" name="Picture 14">
+            <a:extLst>
+              <a:ext uri="{FF2B5EF4-FFF2-40B4-BE49-F238E27FC236}">
+                <a16:creationId xmlns:a16="http://schemas.microsoft.com/office/drawing/2014/main" id="{8AC5C5D7-DBF4-4537-BC6A-8555EA8702D8}"/>
+              </a:ext>
+            </a:extLst>
+          </p:cNvPr>
+          <p:cNvPicPr>
+            <a:picLocks noChangeAspect="1"/>
+          </p:cNvPicPr>
+          <p:nvPr/>
+        </p:nvPicPr>
+        <p:blipFill rotWithShape="1">
+          <a:blip r:embed="rId4" cstate="print">
+            <a:extLst>
+              <a:ext uri="{28A0092B-C50C-407E-A947-70E740481C1C}">
+                <a14:useLocalDpi xmlns:a14="http://schemas.microsoft.com/office/drawing/2010/main" val="0"/>
+              </a:ext>
+            </a:extLst>
+          </a:blip>
+          <a:srcRect l="47229" t="67435" r="11364" b="2492"/>
+          <a:stretch/>
+        </p:blipFill>
+        <p:spPr>
+          <a:xfrm>
+            <a:off x="965200" y="2002745"/>
+            <a:ext cx="3060700" cy="3115355"/>
+          </a:xfrm>
+          <a:prstGeom prst="rect">
+            <a:avLst/>
+          </a:prstGeom>
+        </p:spPr>
+      </p:pic>
     </p:spTree>
     <p:extLst>
       <p:ext uri="{BB962C8B-B14F-4D97-AF65-F5344CB8AC3E}">
@@ -6366,7 +6499,7 @@
           <p:cNvPr id="2" name="Title 1">
             <a:extLst>
               <a:ext uri="{FF2B5EF4-FFF2-40B4-BE49-F238E27FC236}">
-                <a16:creationId xmlns:a16="http://schemas.microsoft.com/office/drawing/2014/main" id="{602ADD70-9300-4D99-BBFC-A1A740D26F93}"/>
+                <a16:creationId xmlns:a16="http://schemas.microsoft.com/office/drawing/2014/main" id="{DED86292-FCD6-4404-B7F8-E67201ED2370}"/>
               </a:ext>
             </a:extLst>
           </p:cNvPr>
@@ -6384,33 +6517,8 @@
           <a:p>
             <a:r>
               <a:rPr lang="en-ZA" dirty="0"/>
-              <a:t>Results and conclusion</a:t>
+              <a:t>Probabilistic Graphical Models</a:t>
             </a:r>
-          </a:p>
-        </p:txBody>
-      </p:sp>
-      <p:sp>
-        <p:nvSpPr>
-          <p:cNvPr id="3" name="Content Placeholder 2">
-            <a:extLst>
-              <a:ext uri="{FF2B5EF4-FFF2-40B4-BE49-F238E27FC236}">
-                <a16:creationId xmlns:a16="http://schemas.microsoft.com/office/drawing/2014/main" id="{C3E65669-9934-41E7-BCCE-3D8002D455A5}"/>
-              </a:ext>
-            </a:extLst>
-          </p:cNvPr>
-          <p:cNvSpPr>
-            <a:spLocks noGrp="1"/>
-          </p:cNvSpPr>
-          <p:nvPr>
-            <p:ph idx="1"/>
-          </p:nvPr>
-        </p:nvSpPr>
-        <p:spPr/>
-        <p:txBody>
-          <a:bodyPr/>
-          <a:lstStyle/>
-          <a:p>
-            <a:endParaRPr lang="en-ZA" dirty="0"/>
           </a:p>
         </p:txBody>
       </p:sp>
@@ -6419,7 +6527,7 @@
           <p:cNvPr id="4" name="Slide Number Placeholder 3">
             <a:extLst>
               <a:ext uri="{FF2B5EF4-FFF2-40B4-BE49-F238E27FC236}">
-                <a16:creationId xmlns:a16="http://schemas.microsoft.com/office/drawing/2014/main" id="{681609DA-FCE8-4DF1-8772-C8AC4AA4AEDE}"/>
+                <a16:creationId xmlns:a16="http://schemas.microsoft.com/office/drawing/2014/main" id="{4FF84512-2B16-4650-BDAA-340B294503BA}"/>
               </a:ext>
             </a:extLst>
           </p:cNvPr>
@@ -6444,6 +6552,950 @@
                 <a:defRPr/>
               </a:pPr>
               <a:t>12</a:t>
+            </a:fld>
+            <a:endParaRPr lang="en-US" dirty="0"/>
+          </a:p>
+        </p:txBody>
+      </p:sp>
+      <p:pic>
+        <p:nvPicPr>
+          <p:cNvPr id="5" name="Content Placeholder 4">
+            <a:extLst>
+              <a:ext uri="{FF2B5EF4-FFF2-40B4-BE49-F238E27FC236}">
+                <a16:creationId xmlns:a16="http://schemas.microsoft.com/office/drawing/2014/main" id="{719A6DEB-1745-44CD-B9DB-5ABD71BEA31A}"/>
+              </a:ext>
+            </a:extLst>
+          </p:cNvPr>
+          <p:cNvPicPr>
+            <a:picLocks noGrp="1" noChangeAspect="1"/>
+          </p:cNvPicPr>
+          <p:nvPr>
+            <p:ph idx="1"/>
+          </p:nvPr>
+        </p:nvPicPr>
+        <p:blipFill>
+          <a:blip r:embed="rId2">
+            <a:extLst>
+              <a:ext uri="{28A0092B-C50C-407E-A947-70E740481C1C}">
+                <a14:useLocalDpi xmlns:a14="http://schemas.microsoft.com/office/drawing/2010/main" val="0"/>
+              </a:ext>
+            </a:extLst>
+          </a:blip>
+          <a:stretch>
+            <a:fillRect/>
+          </a:stretch>
+        </p:blipFill>
+        <p:spPr>
+          <a:xfrm>
+            <a:off x="928624" y="2461260"/>
+            <a:ext cx="585216" cy="2468880"/>
+          </a:xfrm>
+          <a:prstGeom prst="rect">
+            <a:avLst/>
+          </a:prstGeom>
+        </p:spPr>
+      </p:pic>
+      <p:sp>
+        <p:nvSpPr>
+          <p:cNvPr id="6" name="Right Brace 5">
+            <a:extLst>
+              <a:ext uri="{FF2B5EF4-FFF2-40B4-BE49-F238E27FC236}">
+                <a16:creationId xmlns:a16="http://schemas.microsoft.com/office/drawing/2014/main" id="{1C8D9503-0DC5-4404-B22F-8A2D8BC86259}"/>
+              </a:ext>
+            </a:extLst>
+          </p:cNvPr>
+          <p:cNvSpPr/>
+          <p:nvPr/>
+        </p:nvSpPr>
+        <p:spPr bwMode="auto">
+          <a:xfrm>
+            <a:off x="1513840" y="2841674"/>
+            <a:ext cx="329028" cy="2088466"/>
+          </a:xfrm>
+          <a:prstGeom prst="rightBrace">
+            <a:avLst/>
+          </a:prstGeom>
+          <a:solidFill>
+            <a:schemeClr val="bg1"/>
+          </a:solidFill>
+          <a:ln w="12700" cap="sq" cmpd="sng" algn="ctr">
+            <a:solidFill>
+              <a:schemeClr val="tx1"/>
+            </a:solidFill>
+            <a:prstDash val="solid"/>
+            <a:round/>
+            <a:headEnd type="none" w="sm" len="sm"/>
+            <a:tailEnd type="none" w="sm" len="sm"/>
+          </a:ln>
+          <a:effectLst/>
+        </p:spPr>
+        <p:txBody>
+          <a:bodyPr vert="horz" wrap="square" lIns="91440" tIns="45720" rIns="91440" bIns="45720" numCol="1" rtlCol="0" anchor="t" anchorCtr="0" compatLnSpc="1">
+            <a:prstTxWarp prst="textNoShape">
+              <a:avLst/>
+            </a:prstTxWarp>
+          </a:bodyPr>
+          <a:lstStyle/>
+          <a:p>
+            <a:pPr marL="0" marR="0" indent="0" algn="l" defTabSz="914400" rtl="0" eaLnBrk="1" fontAlgn="base" latinLnBrk="0" hangingPunct="1">
+              <a:lnSpc>
+                <a:spcPct val="100000"/>
+              </a:lnSpc>
+              <a:spcBef>
+                <a:spcPct val="0"/>
+              </a:spcBef>
+              <a:spcAft>
+                <a:spcPct val="0"/>
+              </a:spcAft>
+              <a:buClrTx/>
+              <a:buSzTx/>
+              <a:buFontTx/>
+              <a:buNone/>
+              <a:tabLst/>
+            </a:pPr>
+            <a:endParaRPr kumimoji="0" lang="en-ZA" sz="2400" b="0" i="0" u="none" strike="noStrike" cap="none" normalizeH="0" baseline="0">
+              <a:ln>
+                <a:noFill/>
+              </a:ln>
+              <a:solidFill>
+                <a:schemeClr val="tx1"/>
+              </a:solidFill>
+              <a:effectLst/>
+              <a:latin typeface="Times New Roman" pitchFamily="18" charset="0"/>
+            </a:endParaRPr>
+          </a:p>
+        </p:txBody>
+      </p:sp>
+      <p:sp>
+        <p:nvSpPr>
+          <p:cNvPr id="7" name="Right Brace 6">
+            <a:extLst>
+              <a:ext uri="{FF2B5EF4-FFF2-40B4-BE49-F238E27FC236}">
+                <a16:creationId xmlns:a16="http://schemas.microsoft.com/office/drawing/2014/main" id="{D2628566-755A-402B-8A8A-24811486DC76}"/>
+              </a:ext>
+            </a:extLst>
+          </p:cNvPr>
+          <p:cNvSpPr/>
+          <p:nvPr/>
+        </p:nvSpPr>
+        <p:spPr bwMode="auto">
+          <a:xfrm>
+            <a:off x="1513840" y="2461260"/>
+            <a:ext cx="329028" cy="354037"/>
+          </a:xfrm>
+          <a:prstGeom prst="rightBrace">
+            <a:avLst/>
+          </a:prstGeom>
+          <a:solidFill>
+            <a:schemeClr val="bg1"/>
+          </a:solidFill>
+          <a:ln w="12700" cap="sq" cmpd="sng" algn="ctr">
+            <a:solidFill>
+              <a:schemeClr val="tx1"/>
+            </a:solidFill>
+            <a:prstDash val="solid"/>
+            <a:round/>
+            <a:headEnd type="none" w="sm" len="sm"/>
+            <a:tailEnd type="none" w="sm" len="sm"/>
+          </a:ln>
+          <a:effectLst/>
+        </p:spPr>
+        <p:txBody>
+          <a:bodyPr vert="horz" wrap="square" lIns="91440" tIns="45720" rIns="91440" bIns="45720" numCol="1" rtlCol="0" anchor="t" anchorCtr="0" compatLnSpc="1">
+            <a:prstTxWarp prst="textNoShape">
+              <a:avLst/>
+            </a:prstTxWarp>
+          </a:bodyPr>
+          <a:lstStyle/>
+          <a:p>
+            <a:pPr marL="0" marR="0" indent="0" algn="l" defTabSz="914400" rtl="0" eaLnBrk="1" fontAlgn="base" latinLnBrk="0" hangingPunct="1">
+              <a:lnSpc>
+                <a:spcPct val="100000"/>
+              </a:lnSpc>
+              <a:spcBef>
+                <a:spcPct val="0"/>
+              </a:spcBef>
+              <a:spcAft>
+                <a:spcPct val="0"/>
+              </a:spcAft>
+              <a:buClrTx/>
+              <a:buSzTx/>
+              <a:buFontTx/>
+              <a:buNone/>
+              <a:tabLst/>
+            </a:pPr>
+            <a:endParaRPr kumimoji="0" lang="en-ZA" sz="2400" b="0" i="0" u="none" strike="noStrike" cap="none" normalizeH="0" baseline="0">
+              <a:ln>
+                <a:noFill/>
+              </a:ln>
+              <a:solidFill>
+                <a:schemeClr val="tx1"/>
+              </a:solidFill>
+              <a:effectLst/>
+              <a:latin typeface="Times New Roman" pitchFamily="18" charset="0"/>
+            </a:endParaRPr>
+          </a:p>
+        </p:txBody>
+      </p:sp>
+      <p:sp>
+        <p:nvSpPr>
+          <p:cNvPr id="8" name="TextBox 7">
+            <a:extLst>
+              <a:ext uri="{FF2B5EF4-FFF2-40B4-BE49-F238E27FC236}">
+                <a16:creationId xmlns:a16="http://schemas.microsoft.com/office/drawing/2014/main" id="{F8BAC105-D8EF-4741-9D9F-68116298165A}"/>
+              </a:ext>
+            </a:extLst>
+          </p:cNvPr>
+          <p:cNvSpPr txBox="1"/>
+          <p:nvPr/>
+        </p:nvSpPr>
+        <p:spPr>
+          <a:xfrm>
+            <a:off x="1997611" y="2461260"/>
+            <a:ext cx="1997613" cy="461665"/>
+          </a:xfrm>
+          <a:prstGeom prst="rect">
+            <a:avLst/>
+          </a:prstGeom>
+          <a:noFill/>
+        </p:spPr>
+        <p:txBody>
+          <a:bodyPr wrap="square" rtlCol="0">
+            <a:spAutoFit/>
+          </a:bodyPr>
+          <a:lstStyle/>
+          <a:p>
+            <a:r>
+              <a:rPr lang="en-ZA" dirty="0"/>
+              <a:t>Probably a 2</a:t>
+            </a:r>
+          </a:p>
+        </p:txBody>
+      </p:sp>
+      <p:sp>
+        <p:nvSpPr>
+          <p:cNvPr id="10" name="TextBox 9">
+            <a:extLst>
+              <a:ext uri="{FF2B5EF4-FFF2-40B4-BE49-F238E27FC236}">
+                <a16:creationId xmlns:a16="http://schemas.microsoft.com/office/drawing/2014/main" id="{681CACC0-D96A-48CF-8690-2FCA5726E9FC}"/>
+              </a:ext>
+            </a:extLst>
+          </p:cNvPr>
+          <p:cNvSpPr txBox="1"/>
+          <p:nvPr/>
+        </p:nvSpPr>
+        <p:spPr>
+          <a:xfrm>
+            <a:off x="1997611" y="3655074"/>
+            <a:ext cx="1997613" cy="461665"/>
+          </a:xfrm>
+          <a:prstGeom prst="rect">
+            <a:avLst/>
+          </a:prstGeom>
+          <a:noFill/>
+        </p:spPr>
+        <p:txBody>
+          <a:bodyPr wrap="square" rtlCol="0">
+            <a:spAutoFit/>
+          </a:bodyPr>
+          <a:lstStyle/>
+          <a:p>
+            <a:r>
+              <a:rPr lang="en-ZA" dirty="0"/>
+              <a:t>Probably a 2</a:t>
+            </a:r>
+          </a:p>
+        </p:txBody>
+      </p:sp>
+      <p:sp>
+        <p:nvSpPr>
+          <p:cNvPr id="11" name="Right Brace 10">
+            <a:extLst>
+              <a:ext uri="{FF2B5EF4-FFF2-40B4-BE49-F238E27FC236}">
+                <a16:creationId xmlns:a16="http://schemas.microsoft.com/office/drawing/2014/main" id="{C80FFEEC-AA0F-4C73-BB36-84C594DD7416}"/>
+              </a:ext>
+            </a:extLst>
+          </p:cNvPr>
+          <p:cNvSpPr/>
+          <p:nvPr/>
+        </p:nvSpPr>
+        <p:spPr bwMode="auto">
+          <a:xfrm>
+            <a:off x="3820939" y="2568888"/>
+            <a:ext cx="174285" cy="1547851"/>
+          </a:xfrm>
+          <a:prstGeom prst="rightBrace">
+            <a:avLst/>
+          </a:prstGeom>
+          <a:solidFill>
+            <a:schemeClr val="bg1"/>
+          </a:solidFill>
+          <a:ln w="12700" cap="sq" cmpd="sng" algn="ctr">
+            <a:solidFill>
+              <a:schemeClr val="tx1"/>
+            </a:solidFill>
+            <a:prstDash val="solid"/>
+            <a:round/>
+            <a:headEnd type="none" w="sm" len="sm"/>
+            <a:tailEnd type="none" w="sm" len="sm"/>
+          </a:ln>
+          <a:effectLst/>
+        </p:spPr>
+        <p:txBody>
+          <a:bodyPr vert="horz" wrap="square" lIns="91440" tIns="45720" rIns="91440" bIns="45720" numCol="1" rtlCol="0" anchor="t" anchorCtr="0" compatLnSpc="1">
+            <a:prstTxWarp prst="textNoShape">
+              <a:avLst/>
+            </a:prstTxWarp>
+          </a:bodyPr>
+          <a:lstStyle/>
+          <a:p>
+            <a:pPr marL="0" marR="0" indent="0" algn="l" defTabSz="914400" rtl="0" eaLnBrk="1" fontAlgn="base" latinLnBrk="0" hangingPunct="1">
+              <a:lnSpc>
+                <a:spcPct val="100000"/>
+              </a:lnSpc>
+              <a:spcBef>
+                <a:spcPct val="0"/>
+              </a:spcBef>
+              <a:spcAft>
+                <a:spcPct val="0"/>
+              </a:spcAft>
+              <a:buClrTx/>
+              <a:buSzTx/>
+              <a:buFontTx/>
+              <a:buNone/>
+              <a:tabLst/>
+            </a:pPr>
+            <a:endParaRPr kumimoji="0" lang="en-ZA" sz="2400" b="0" i="0" u="none" strike="noStrike" cap="none" normalizeH="0" baseline="0">
+              <a:ln>
+                <a:noFill/>
+              </a:ln>
+              <a:solidFill>
+                <a:schemeClr val="tx1"/>
+              </a:solidFill>
+              <a:effectLst/>
+              <a:latin typeface="Times New Roman" pitchFamily="18" charset="0"/>
+            </a:endParaRPr>
+          </a:p>
+        </p:txBody>
+      </p:sp>
+      <p:sp>
+        <p:nvSpPr>
+          <p:cNvPr id="13" name="TextBox 12">
+            <a:extLst>
+              <a:ext uri="{FF2B5EF4-FFF2-40B4-BE49-F238E27FC236}">
+                <a16:creationId xmlns:a16="http://schemas.microsoft.com/office/drawing/2014/main" id="{C8F00508-22D0-430F-A8BE-D2F6CFAD97D9}"/>
+              </a:ext>
+            </a:extLst>
+          </p:cNvPr>
+          <p:cNvSpPr txBox="1"/>
+          <p:nvPr/>
+        </p:nvSpPr>
+        <p:spPr>
+          <a:xfrm>
+            <a:off x="4119488" y="3111980"/>
+            <a:ext cx="1997613" cy="461665"/>
+          </a:xfrm>
+          <a:prstGeom prst="rect">
+            <a:avLst/>
+          </a:prstGeom>
+          <a:noFill/>
+        </p:spPr>
+        <p:txBody>
+          <a:bodyPr wrap="square" rtlCol="0">
+            <a:spAutoFit/>
+          </a:bodyPr>
+          <a:lstStyle/>
+          <a:p>
+            <a:r>
+              <a:rPr lang="en-ZA" dirty="0"/>
+              <a:t>Final guess: 2</a:t>
+            </a:r>
+          </a:p>
+        </p:txBody>
+      </p:sp>
+      <p:pic>
+        <p:nvPicPr>
+          <p:cNvPr id="14" name="Content Placeholder 4">
+            <a:extLst>
+              <a:ext uri="{FF2B5EF4-FFF2-40B4-BE49-F238E27FC236}">
+                <a16:creationId xmlns:a16="http://schemas.microsoft.com/office/drawing/2014/main" id="{FB96CE26-1622-4D76-B8AE-8E43B779C190}"/>
+              </a:ext>
+            </a:extLst>
+          </p:cNvPr>
+          <p:cNvPicPr>
+            <a:picLocks noChangeAspect="1"/>
+          </p:cNvPicPr>
+          <p:nvPr/>
+        </p:nvPicPr>
+        <p:blipFill rotWithShape="1">
+          <a:blip r:embed="rId2">
+            <a:extLst>
+              <a:ext uri="{28A0092B-C50C-407E-A947-70E740481C1C}">
+                <a14:useLocalDpi xmlns:a14="http://schemas.microsoft.com/office/drawing/2010/main" val="0"/>
+              </a:ext>
+            </a:extLst>
+          </a:blip>
+          <a:srcRect r="69478"/>
+          <a:stretch/>
+        </p:blipFill>
+        <p:spPr bwMode="auto">
+          <a:xfrm>
+            <a:off x="6412680" y="2545623"/>
+            <a:ext cx="178620" cy="2468880"/>
+          </a:xfrm>
+          <a:prstGeom prst="rect">
+            <a:avLst/>
+          </a:prstGeom>
+          <a:noFill/>
+          <a:ln>
+            <a:noFill/>
+          </a:ln>
+          <a:extLst>
+            <a:ext uri="{909E8E84-426E-40DD-AFC4-6F175D3DCCD1}">
+              <a14:hiddenFill xmlns:a14="http://schemas.microsoft.com/office/drawing/2010/main">
+                <a:solidFill>
+                  <a:srgbClr val="FFFFFF"/>
+                </a:solidFill>
+              </a14:hiddenFill>
+            </a:ext>
+            <a:ext uri="{91240B29-F687-4F45-9708-019B960494DF}">
+              <a14:hiddenLine xmlns:a14="http://schemas.microsoft.com/office/drawing/2010/main" w="9525">
+                <a:solidFill>
+                  <a:srgbClr val="000000"/>
+                </a:solidFill>
+                <a:miter lim="800000"/>
+                <a:headEnd/>
+                <a:tailEnd/>
+              </a14:hiddenLine>
+            </a:ext>
+          </a:extLst>
+        </p:spPr>
+      </p:pic>
+      <p:sp>
+        <p:nvSpPr>
+          <p:cNvPr id="15" name="Right Brace 14">
+            <a:extLst>
+              <a:ext uri="{FF2B5EF4-FFF2-40B4-BE49-F238E27FC236}">
+                <a16:creationId xmlns:a16="http://schemas.microsoft.com/office/drawing/2014/main" id="{3059CC2C-3C83-4048-8404-C13DAD38143F}"/>
+              </a:ext>
+            </a:extLst>
+          </p:cNvPr>
+          <p:cNvSpPr/>
+          <p:nvPr/>
+        </p:nvSpPr>
+        <p:spPr bwMode="auto">
+          <a:xfrm>
+            <a:off x="6997896" y="2926037"/>
+            <a:ext cx="329028" cy="2088466"/>
+          </a:xfrm>
+          <a:prstGeom prst="rightBrace">
+            <a:avLst/>
+          </a:prstGeom>
+          <a:solidFill>
+            <a:schemeClr val="bg1"/>
+          </a:solidFill>
+          <a:ln w="12700" cap="sq" cmpd="sng" algn="ctr">
+            <a:solidFill>
+              <a:schemeClr val="tx1"/>
+            </a:solidFill>
+            <a:prstDash val="solid"/>
+            <a:round/>
+            <a:headEnd type="none" w="sm" len="sm"/>
+            <a:tailEnd type="none" w="sm" len="sm"/>
+          </a:ln>
+          <a:effectLst/>
+        </p:spPr>
+        <p:txBody>
+          <a:bodyPr vert="horz" wrap="square" lIns="91440" tIns="45720" rIns="91440" bIns="45720" numCol="1" rtlCol="0" anchor="t" anchorCtr="0" compatLnSpc="1">
+            <a:prstTxWarp prst="textNoShape">
+              <a:avLst/>
+            </a:prstTxWarp>
+          </a:bodyPr>
+          <a:lstStyle/>
+          <a:p>
+            <a:pPr marL="0" marR="0" indent="0" algn="l" defTabSz="914400" rtl="0" eaLnBrk="1" fontAlgn="base" latinLnBrk="0" hangingPunct="1">
+              <a:lnSpc>
+                <a:spcPct val="100000"/>
+              </a:lnSpc>
+              <a:spcBef>
+                <a:spcPct val="0"/>
+              </a:spcBef>
+              <a:spcAft>
+                <a:spcPct val="0"/>
+              </a:spcAft>
+              <a:buClrTx/>
+              <a:buSzTx/>
+              <a:buFontTx/>
+              <a:buNone/>
+              <a:tabLst/>
+            </a:pPr>
+            <a:endParaRPr kumimoji="0" lang="en-ZA" sz="2400" b="0" i="0" u="none" strike="noStrike" cap="none" normalizeH="0" baseline="0">
+              <a:ln>
+                <a:noFill/>
+              </a:ln>
+              <a:solidFill>
+                <a:schemeClr val="tx1"/>
+              </a:solidFill>
+              <a:effectLst/>
+              <a:latin typeface="Times New Roman" pitchFamily="18" charset="0"/>
+            </a:endParaRPr>
+          </a:p>
+        </p:txBody>
+      </p:sp>
+      <p:sp>
+        <p:nvSpPr>
+          <p:cNvPr id="16" name="Right Brace 15">
+            <a:extLst>
+              <a:ext uri="{FF2B5EF4-FFF2-40B4-BE49-F238E27FC236}">
+                <a16:creationId xmlns:a16="http://schemas.microsoft.com/office/drawing/2014/main" id="{8A977A1D-0F19-47EF-856E-17EE3EA2ABB6}"/>
+              </a:ext>
+            </a:extLst>
+          </p:cNvPr>
+          <p:cNvSpPr/>
+          <p:nvPr/>
+        </p:nvSpPr>
+        <p:spPr bwMode="auto">
+          <a:xfrm>
+            <a:off x="6997896" y="2545623"/>
+            <a:ext cx="329028" cy="354037"/>
+          </a:xfrm>
+          <a:prstGeom prst="rightBrace">
+            <a:avLst/>
+          </a:prstGeom>
+          <a:solidFill>
+            <a:schemeClr val="bg1"/>
+          </a:solidFill>
+          <a:ln w="12700" cap="sq" cmpd="sng" algn="ctr">
+            <a:solidFill>
+              <a:schemeClr val="tx1"/>
+            </a:solidFill>
+            <a:prstDash val="solid"/>
+            <a:round/>
+            <a:headEnd type="none" w="sm" len="sm"/>
+            <a:tailEnd type="none" w="sm" len="sm"/>
+          </a:ln>
+          <a:effectLst/>
+        </p:spPr>
+        <p:txBody>
+          <a:bodyPr vert="horz" wrap="square" lIns="91440" tIns="45720" rIns="91440" bIns="45720" numCol="1" rtlCol="0" anchor="t" anchorCtr="0" compatLnSpc="1">
+            <a:prstTxWarp prst="textNoShape">
+              <a:avLst/>
+            </a:prstTxWarp>
+          </a:bodyPr>
+          <a:lstStyle/>
+          <a:p>
+            <a:pPr marL="0" marR="0" indent="0" algn="l" defTabSz="914400" rtl="0" eaLnBrk="1" fontAlgn="base" latinLnBrk="0" hangingPunct="1">
+              <a:lnSpc>
+                <a:spcPct val="100000"/>
+              </a:lnSpc>
+              <a:spcBef>
+                <a:spcPct val="0"/>
+              </a:spcBef>
+              <a:spcAft>
+                <a:spcPct val="0"/>
+              </a:spcAft>
+              <a:buClrTx/>
+              <a:buSzTx/>
+              <a:buFontTx/>
+              <a:buNone/>
+              <a:tabLst/>
+            </a:pPr>
+            <a:endParaRPr kumimoji="0" lang="en-ZA" sz="2400" b="0" i="0" u="none" strike="noStrike" cap="none" normalizeH="0" baseline="0">
+              <a:ln>
+                <a:noFill/>
+              </a:ln>
+              <a:solidFill>
+                <a:schemeClr val="tx1"/>
+              </a:solidFill>
+              <a:effectLst/>
+              <a:latin typeface="Times New Roman" pitchFamily="18" charset="0"/>
+            </a:endParaRPr>
+          </a:p>
+        </p:txBody>
+      </p:sp>
+      <p:sp>
+        <p:nvSpPr>
+          <p:cNvPr id="17" name="TextBox 16">
+            <a:extLst>
+              <a:ext uri="{FF2B5EF4-FFF2-40B4-BE49-F238E27FC236}">
+                <a16:creationId xmlns:a16="http://schemas.microsoft.com/office/drawing/2014/main" id="{EF5D292E-E20C-4B8F-8E83-4B3936AD2B63}"/>
+              </a:ext>
+            </a:extLst>
+          </p:cNvPr>
+          <p:cNvSpPr txBox="1"/>
+          <p:nvPr/>
+        </p:nvSpPr>
+        <p:spPr>
+          <a:xfrm>
+            <a:off x="7481667" y="2545623"/>
+            <a:ext cx="1997613" cy="461665"/>
+          </a:xfrm>
+          <a:prstGeom prst="rect">
+            <a:avLst/>
+          </a:prstGeom>
+          <a:noFill/>
+        </p:spPr>
+        <p:txBody>
+          <a:bodyPr wrap="square" rtlCol="0">
+            <a:spAutoFit/>
+          </a:bodyPr>
+          <a:lstStyle/>
+          <a:p>
+            <a:r>
+              <a:rPr lang="en-ZA" dirty="0"/>
+              <a:t>Probably a 6</a:t>
+            </a:r>
+          </a:p>
+        </p:txBody>
+      </p:sp>
+      <p:sp>
+        <p:nvSpPr>
+          <p:cNvPr id="18" name="TextBox 17">
+            <a:extLst>
+              <a:ext uri="{FF2B5EF4-FFF2-40B4-BE49-F238E27FC236}">
+                <a16:creationId xmlns:a16="http://schemas.microsoft.com/office/drawing/2014/main" id="{0D3E4B30-C308-4AAE-A7FA-F64CCA1D8209}"/>
+              </a:ext>
+            </a:extLst>
+          </p:cNvPr>
+          <p:cNvSpPr txBox="1"/>
+          <p:nvPr/>
+        </p:nvSpPr>
+        <p:spPr>
+          <a:xfrm>
+            <a:off x="7481667" y="3739437"/>
+            <a:ext cx="1997613" cy="830997"/>
+          </a:xfrm>
+          <a:prstGeom prst="rect">
+            <a:avLst/>
+          </a:prstGeom>
+          <a:noFill/>
+        </p:spPr>
+        <p:txBody>
+          <a:bodyPr wrap="square" rtlCol="0">
+            <a:spAutoFit/>
+          </a:bodyPr>
+          <a:lstStyle/>
+          <a:p>
+            <a:r>
+              <a:rPr lang="en-ZA" dirty="0"/>
+              <a:t>Probably a 3 or 6</a:t>
+            </a:r>
+          </a:p>
+        </p:txBody>
+      </p:sp>
+      <p:sp>
+        <p:nvSpPr>
+          <p:cNvPr id="19" name="Right Brace 18">
+            <a:extLst>
+              <a:ext uri="{FF2B5EF4-FFF2-40B4-BE49-F238E27FC236}">
+                <a16:creationId xmlns:a16="http://schemas.microsoft.com/office/drawing/2014/main" id="{9111452D-61D6-480D-8066-6BAFF6E2BDC8}"/>
+              </a:ext>
+            </a:extLst>
+          </p:cNvPr>
+          <p:cNvSpPr/>
+          <p:nvPr/>
+        </p:nvSpPr>
+        <p:spPr bwMode="auto">
+          <a:xfrm>
+            <a:off x="9304995" y="2653251"/>
+            <a:ext cx="174285" cy="1547851"/>
+          </a:xfrm>
+          <a:prstGeom prst="rightBrace">
+            <a:avLst/>
+          </a:prstGeom>
+          <a:solidFill>
+            <a:schemeClr val="bg1"/>
+          </a:solidFill>
+          <a:ln w="12700" cap="sq" cmpd="sng" algn="ctr">
+            <a:solidFill>
+              <a:schemeClr val="tx1"/>
+            </a:solidFill>
+            <a:prstDash val="solid"/>
+            <a:round/>
+            <a:headEnd type="none" w="sm" len="sm"/>
+            <a:tailEnd type="none" w="sm" len="sm"/>
+          </a:ln>
+          <a:effectLst/>
+        </p:spPr>
+        <p:txBody>
+          <a:bodyPr vert="horz" wrap="square" lIns="91440" tIns="45720" rIns="91440" bIns="45720" numCol="1" rtlCol="0" anchor="t" anchorCtr="0" compatLnSpc="1">
+            <a:prstTxWarp prst="textNoShape">
+              <a:avLst/>
+            </a:prstTxWarp>
+          </a:bodyPr>
+          <a:lstStyle/>
+          <a:p>
+            <a:pPr marL="0" marR="0" indent="0" algn="l" defTabSz="914400" rtl="0" eaLnBrk="1" fontAlgn="base" latinLnBrk="0" hangingPunct="1">
+              <a:lnSpc>
+                <a:spcPct val="100000"/>
+              </a:lnSpc>
+              <a:spcBef>
+                <a:spcPct val="0"/>
+              </a:spcBef>
+              <a:spcAft>
+                <a:spcPct val="0"/>
+              </a:spcAft>
+              <a:buClrTx/>
+              <a:buSzTx/>
+              <a:buFontTx/>
+              <a:buNone/>
+              <a:tabLst/>
+            </a:pPr>
+            <a:endParaRPr kumimoji="0" lang="en-ZA" sz="2400" b="0" i="0" u="none" strike="noStrike" cap="none" normalizeH="0" baseline="0">
+              <a:ln>
+                <a:noFill/>
+              </a:ln>
+              <a:solidFill>
+                <a:schemeClr val="tx1"/>
+              </a:solidFill>
+              <a:effectLst/>
+              <a:latin typeface="Times New Roman" pitchFamily="18" charset="0"/>
+            </a:endParaRPr>
+          </a:p>
+        </p:txBody>
+      </p:sp>
+      <p:sp>
+        <p:nvSpPr>
+          <p:cNvPr id="20" name="TextBox 19">
+            <a:extLst>
+              <a:ext uri="{FF2B5EF4-FFF2-40B4-BE49-F238E27FC236}">
+                <a16:creationId xmlns:a16="http://schemas.microsoft.com/office/drawing/2014/main" id="{0A3EE3A6-7DEE-4648-84AF-764358E2B7FE}"/>
+              </a:ext>
+            </a:extLst>
+          </p:cNvPr>
+          <p:cNvSpPr txBox="1"/>
+          <p:nvPr/>
+        </p:nvSpPr>
+        <p:spPr>
+          <a:xfrm>
+            <a:off x="9603544" y="3196343"/>
+            <a:ext cx="1997613" cy="461665"/>
+          </a:xfrm>
+          <a:prstGeom prst="rect">
+            <a:avLst/>
+          </a:prstGeom>
+          <a:noFill/>
+        </p:spPr>
+        <p:txBody>
+          <a:bodyPr wrap="square" rtlCol="0">
+            <a:spAutoFit/>
+          </a:bodyPr>
+          <a:lstStyle/>
+          <a:p>
+            <a:r>
+              <a:rPr lang="en-ZA" dirty="0"/>
+              <a:t>Final guess: 6</a:t>
+            </a:r>
+          </a:p>
+        </p:txBody>
+      </p:sp>
+      <p:pic>
+        <p:nvPicPr>
+          <p:cNvPr id="24" name="Picture 23">
+            <a:extLst>
+              <a:ext uri="{FF2B5EF4-FFF2-40B4-BE49-F238E27FC236}">
+                <a16:creationId xmlns:a16="http://schemas.microsoft.com/office/drawing/2014/main" id="{FA26EC47-9D24-46DB-B9AB-6ED50D77166C}"/>
+              </a:ext>
+            </a:extLst>
+          </p:cNvPr>
+          <p:cNvPicPr>
+            <a:picLocks noChangeAspect="1"/>
+          </p:cNvPicPr>
+          <p:nvPr/>
+        </p:nvPicPr>
+        <p:blipFill rotWithShape="1">
+          <a:blip r:embed="rId3">
+            <a:extLst>
+              <a:ext uri="{28A0092B-C50C-407E-A947-70E740481C1C}">
+                <a14:useLocalDpi xmlns:a14="http://schemas.microsoft.com/office/drawing/2010/main" val="0"/>
+              </a:ext>
+            </a:extLst>
+          </a:blip>
+          <a:srcRect l="26046" t="72796" r="71051" b="7361"/>
+          <a:stretch/>
+        </p:blipFill>
+        <p:spPr>
+          <a:xfrm>
+            <a:off x="6654799" y="2922925"/>
+            <a:ext cx="218833" cy="2115909"/>
+          </a:xfrm>
+          <a:prstGeom prst="rect">
+            <a:avLst/>
+          </a:prstGeom>
+        </p:spPr>
+      </p:pic>
+      <p:pic>
+        <p:nvPicPr>
+          <p:cNvPr id="25" name="Picture 24">
+            <a:extLst>
+              <a:ext uri="{FF2B5EF4-FFF2-40B4-BE49-F238E27FC236}">
+                <a16:creationId xmlns:a16="http://schemas.microsoft.com/office/drawing/2014/main" id="{01300C48-742F-4C47-B454-A45E4A1C78B3}"/>
+              </a:ext>
+            </a:extLst>
+          </p:cNvPr>
+          <p:cNvPicPr>
+            <a:picLocks noChangeAspect="1"/>
+          </p:cNvPicPr>
+          <p:nvPr/>
+        </p:nvPicPr>
+        <p:blipFill rotWithShape="1">
+          <a:blip r:embed="rId3">
+            <a:extLst>
+              <a:ext uri="{28A0092B-C50C-407E-A947-70E740481C1C}">
+                <a14:useLocalDpi xmlns:a14="http://schemas.microsoft.com/office/drawing/2010/main" val="0"/>
+              </a:ext>
+            </a:extLst>
+          </a:blip>
+          <a:srcRect l="25602" t="67379" r="71113" b="30365"/>
+          <a:stretch/>
+        </p:blipFill>
+        <p:spPr>
+          <a:xfrm>
+            <a:off x="6621780" y="2590031"/>
+            <a:ext cx="247650" cy="240506"/>
+          </a:xfrm>
+          <a:prstGeom prst="rect">
+            <a:avLst/>
+          </a:prstGeom>
+        </p:spPr>
+      </p:pic>
+    </p:spTree>
+    <p:extLst>
+      <p:ext uri="{BB962C8B-B14F-4D97-AF65-F5344CB8AC3E}">
+        <p14:creationId xmlns:p14="http://schemas.microsoft.com/office/powerpoint/2010/main" val="24009324"/>
+      </p:ext>
+    </p:extLst>
+  </p:cSld>
+  <p:clrMapOvr>
+    <a:masterClrMapping/>
+  </p:clrMapOvr>
+</p:sld>
+</file>
+
+<file path=ppt/slides/slide13.xml><?xml version="1.0" encoding="utf-8"?>
+<p:sld xmlns:a="http://schemas.openxmlformats.org/drawingml/2006/main" xmlns:r="http://schemas.openxmlformats.org/officeDocument/2006/relationships" xmlns:p="http://schemas.openxmlformats.org/presentationml/2006/main">
+  <p:cSld>
+    <p:spTree>
+      <p:nvGrpSpPr>
+        <p:cNvPr id="1" name=""/>
+        <p:cNvGrpSpPr/>
+        <p:nvPr/>
+      </p:nvGrpSpPr>
+      <p:grpSpPr>
+        <a:xfrm>
+          <a:off x="0" y="0"/>
+          <a:ext cx="0" cy="0"/>
+          <a:chOff x="0" y="0"/>
+          <a:chExt cx="0" cy="0"/>
+        </a:xfrm>
+      </p:grpSpPr>
+      <p:sp>
+        <p:nvSpPr>
+          <p:cNvPr id="2" name="Title 1">
+            <a:extLst>
+              <a:ext uri="{FF2B5EF4-FFF2-40B4-BE49-F238E27FC236}">
+                <a16:creationId xmlns:a16="http://schemas.microsoft.com/office/drawing/2014/main" id="{602ADD70-9300-4D99-BBFC-A1A740D26F93}"/>
+              </a:ext>
+            </a:extLst>
+          </p:cNvPr>
+          <p:cNvSpPr>
+            <a:spLocks noGrp="1"/>
+          </p:cNvSpPr>
+          <p:nvPr>
+            <p:ph type="title"/>
+          </p:nvPr>
+        </p:nvSpPr>
+        <p:spPr/>
+        <p:txBody>
+          <a:bodyPr/>
+          <a:lstStyle/>
+          <a:p>
+            <a:r>
+              <a:rPr lang="en-ZA" dirty="0"/>
+              <a:t>Results and conclusion</a:t>
+            </a:r>
+          </a:p>
+        </p:txBody>
+      </p:sp>
+      <p:sp>
+        <p:nvSpPr>
+          <p:cNvPr id="3" name="Content Placeholder 2">
+            <a:extLst>
+              <a:ext uri="{FF2B5EF4-FFF2-40B4-BE49-F238E27FC236}">
+                <a16:creationId xmlns:a16="http://schemas.microsoft.com/office/drawing/2014/main" id="{C3E65669-9934-41E7-BCCE-3D8002D455A5}"/>
+              </a:ext>
+            </a:extLst>
+          </p:cNvPr>
+          <p:cNvSpPr>
+            <a:spLocks noGrp="1"/>
+          </p:cNvSpPr>
+          <p:nvPr>
+            <p:ph idx="1"/>
+          </p:nvPr>
+        </p:nvSpPr>
+        <p:spPr/>
+        <p:txBody>
+          <a:bodyPr/>
+          <a:lstStyle/>
+          <a:p>
+            <a:r>
+              <a:rPr lang="en-ZA" dirty="0"/>
+              <a:t>Grades 1000 test in 30 minutes</a:t>
+            </a:r>
+          </a:p>
+          <a:p>
+            <a:r>
+              <a:rPr lang="en-ZA" dirty="0"/>
+              <a:t>Automatic grading accuracy 97.1%</a:t>
+            </a:r>
+          </a:p>
+          <a:p>
+            <a:r>
+              <a:rPr lang="en-ZA" dirty="0"/>
+              <a:t>Sends 2.8% of tests for manual grading</a:t>
+            </a:r>
+          </a:p>
+          <a:p>
+            <a:r>
+              <a:rPr lang="en-ZA" dirty="0"/>
+              <a:t>In a tutorial session on average only 0.1% or 1 test or less gets graded incorrectly</a:t>
+            </a:r>
+          </a:p>
+          <a:p>
+            <a:endParaRPr lang="en-ZA" dirty="0"/>
+          </a:p>
+        </p:txBody>
+      </p:sp>
+      <p:sp>
+        <p:nvSpPr>
+          <p:cNvPr id="4" name="Slide Number Placeholder 3">
+            <a:extLst>
+              <a:ext uri="{FF2B5EF4-FFF2-40B4-BE49-F238E27FC236}">
+                <a16:creationId xmlns:a16="http://schemas.microsoft.com/office/drawing/2014/main" id="{681609DA-FCE8-4DF1-8772-C8AC4AA4AEDE}"/>
+              </a:ext>
+            </a:extLst>
+          </p:cNvPr>
+          <p:cNvSpPr>
+            <a:spLocks noGrp="1"/>
+          </p:cNvSpPr>
+          <p:nvPr>
+            <p:ph type="sldNum" sz="quarter" idx="10"/>
+          </p:nvPr>
+        </p:nvSpPr>
+        <p:spPr/>
+        <p:txBody>
+          <a:bodyPr/>
+          <a:lstStyle/>
+          <a:p>
+            <a:pPr>
+              <a:defRPr/>
+            </a:pPr>
+            <a:fld id="{A27591B5-593E-49C1-8C2D-4B5CC8495990}" type="slidenum">
+              <a:rPr lang="en-US" smtClean="0"/>
+              <a:pPr>
+                <a:defRPr/>
+              </a:pPr>
+              <a:t>13</a:t>
             </a:fld>
             <a:endParaRPr lang="en-US" dirty="0"/>
           </a:p>
@@ -6518,54 +7570,76 @@
           <a:lstStyle/>
           <a:p>
             <a:r>
-              <a:rPr lang="en-US" dirty="0"/>
+              <a:rPr lang="en-US" kern="1200" dirty="0">
+                <a:latin typeface="Times New Roman" pitchFamily="18" charset="0"/>
+              </a:rPr>
               <a:t>Introduction</a:t>
             </a:r>
           </a:p>
           <a:p>
             <a:r>
-              <a:rPr lang="en-US" dirty="0"/>
+              <a:rPr lang="en-US" kern="1200" dirty="0">
+                <a:latin typeface="Times New Roman" pitchFamily="18" charset="0"/>
+              </a:rPr>
               <a:t>Solution</a:t>
             </a:r>
           </a:p>
           <a:p>
             <a:r>
-              <a:rPr lang="en-US" dirty="0"/>
+              <a:rPr lang="en-US" kern="1200" dirty="0">
+                <a:latin typeface="Times New Roman" pitchFamily="18" charset="0"/>
+              </a:rPr>
               <a:t>System overview</a:t>
             </a:r>
           </a:p>
           <a:p>
             <a:r>
-              <a:rPr lang="en-US" dirty="0"/>
+              <a:rPr lang="en-US" kern="1200" dirty="0">
+                <a:latin typeface="Times New Roman" pitchFamily="18" charset="0"/>
+              </a:rPr>
               <a:t>Image processing</a:t>
             </a:r>
           </a:p>
           <a:p>
             <a:r>
-              <a:rPr lang="en-ZA" dirty="0"/>
+              <a:rPr lang="en-ZA" kern="1200" dirty="0">
+                <a:latin typeface="Times New Roman" pitchFamily="18" charset="0"/>
+              </a:rPr>
               <a:t>Machine learning</a:t>
             </a:r>
           </a:p>
           <a:p>
             <a:pPr lvl="1"/>
             <a:r>
-              <a:rPr lang="en-ZA" dirty="0"/>
+              <a:rPr lang="en-ZA" sz="2400" kern="1200" dirty="0">
+                <a:latin typeface="Times New Roman" pitchFamily="18" charset="0"/>
+                <a:ea typeface="+mn-ea"/>
+                <a:cs typeface="+mn-cs"/>
+              </a:rPr>
               <a:t>Character recognition using Neural Networks</a:t>
             </a:r>
           </a:p>
           <a:p>
             <a:pPr lvl="1"/>
             <a:r>
-              <a:rPr lang="en-ZA" dirty="0"/>
+              <a:rPr lang="en-ZA" sz="2400" kern="1200" dirty="0">
+                <a:latin typeface="Times New Roman" pitchFamily="18" charset="0"/>
+                <a:ea typeface="+mn-ea"/>
+                <a:cs typeface="+mn-cs"/>
+              </a:rPr>
               <a:t>Final decision making using Probabilistic Graphical Models</a:t>
             </a:r>
           </a:p>
           <a:p>
             <a:r>
-              <a:rPr lang="en-ZA" dirty="0"/>
+              <a:rPr lang="en-ZA" kern="1200" dirty="0">
+                <a:latin typeface="Times New Roman" pitchFamily="18" charset="0"/>
+              </a:rPr>
               <a:t>Results and conclusions</a:t>
             </a:r>
-            <a:endParaRPr lang="en-GB" dirty="0"/>
+            <a:endParaRPr lang="en-GB" kern="1200" dirty="0">
+              <a:latin typeface="Times New Roman" pitchFamily="18" charset="0"/>
+            </a:endParaRPr>
           </a:p>
         </p:txBody>
       </p:sp>
@@ -6952,6 +8026,46 @@
           </a:extLst>
         </p:spPr>
       </p:pic>
+      <p:sp>
+        <p:nvSpPr>
+          <p:cNvPr id="9" name="Slide Number Placeholder 3">
+            <a:extLst>
+              <a:ext uri="{FF2B5EF4-FFF2-40B4-BE49-F238E27FC236}">
+                <a16:creationId xmlns:a16="http://schemas.microsoft.com/office/drawing/2014/main" id="{22AF55DE-8BAE-4A54-991E-FEBD38AD0506}"/>
+              </a:ext>
+            </a:extLst>
+          </p:cNvPr>
+          <p:cNvSpPr>
+            <a:spLocks noGrp="1"/>
+          </p:cNvSpPr>
+          <p:nvPr>
+            <p:ph type="sldNum" sz="quarter" idx="10"/>
+          </p:nvPr>
+        </p:nvSpPr>
+        <p:spPr>
+          <a:xfrm>
+            <a:off x="609600" y="6477000"/>
+            <a:ext cx="2540000" cy="457200"/>
+          </a:xfrm>
+        </p:spPr>
+        <p:txBody>
+          <a:bodyPr/>
+          <a:lstStyle/>
+          <a:p>
+            <a:pPr>
+              <a:defRPr/>
+            </a:pPr>
+            <a:fld id="{A27591B5-593E-49C1-8C2D-4B5CC8495990}" type="slidenum">
+              <a:rPr lang="en-US" smtClean="0"/>
+              <a:pPr>
+                <a:defRPr/>
+              </a:pPr>
+              <a:t>3</a:t>
+            </a:fld>
+            <a:endParaRPr lang="en-US" dirty="0"/>
+          </a:p>
+        </p:txBody>
+      </p:sp>
     </p:spTree>
     <p:extLst>
       <p:ext uri="{BB962C8B-B14F-4D97-AF65-F5344CB8AC3E}">
@@ -7459,6 +8573,46 @@
           </a:p>
           <a:p>
             <a:endParaRPr lang="en-ZA" dirty="0"/>
+          </a:p>
+        </p:txBody>
+      </p:sp>
+      <p:sp>
+        <p:nvSpPr>
+          <p:cNvPr id="7" name="Slide Number Placeholder 3">
+            <a:extLst>
+              <a:ext uri="{FF2B5EF4-FFF2-40B4-BE49-F238E27FC236}">
+                <a16:creationId xmlns:a16="http://schemas.microsoft.com/office/drawing/2014/main" id="{D6FA926E-2FF6-4884-82CE-A00332B7ACB5}"/>
+              </a:ext>
+            </a:extLst>
+          </p:cNvPr>
+          <p:cNvSpPr>
+            <a:spLocks noGrp="1"/>
+          </p:cNvSpPr>
+          <p:nvPr>
+            <p:ph type="sldNum" sz="quarter" idx="10"/>
+          </p:nvPr>
+        </p:nvSpPr>
+        <p:spPr>
+          <a:xfrm>
+            <a:off x="609600" y="6477000"/>
+            <a:ext cx="2540000" cy="457200"/>
+          </a:xfrm>
+        </p:spPr>
+        <p:txBody>
+          <a:bodyPr/>
+          <a:lstStyle/>
+          <a:p>
+            <a:pPr>
+              <a:defRPr/>
+            </a:pPr>
+            <a:fld id="{A27591B5-593E-49C1-8C2D-4B5CC8495990}" type="slidenum">
+              <a:rPr lang="en-US" smtClean="0"/>
+              <a:pPr>
+                <a:defRPr/>
+              </a:pPr>
+              <a:t>4</a:t>
+            </a:fld>
+            <a:endParaRPr lang="en-US" dirty="0"/>
           </a:p>
         </p:txBody>
       </p:sp>
@@ -7925,8 +9079,8 @@
         </p:nvSpPr>
         <p:spPr>
           <a:xfrm>
-            <a:off x="7721460" y="4414520"/>
-            <a:ext cx="1770033" cy="1536700"/>
+            <a:off x="7821638" y="4414520"/>
+            <a:ext cx="1669855" cy="1536700"/>
           </a:xfrm>
           <a:prstGeom prst="ellipse">
             <a:avLst/>
@@ -7975,8 +9129,8 @@
         </p:nvSpPr>
         <p:spPr>
           <a:xfrm>
-            <a:off x="6201411" y="4490720"/>
-            <a:ext cx="1686765" cy="1384300"/>
+            <a:off x="6201412" y="4490720"/>
+            <a:ext cx="1620226" cy="1384300"/>
           </a:xfrm>
           <a:prstGeom prst="ellipse">
             <a:avLst/>
@@ -8058,6 +9212,46 @@
           <a:p>
             <a:pPr algn="ctr"/>
             <a:endParaRPr lang="en-ZA"/>
+          </a:p>
+        </p:txBody>
+      </p:sp>
+      <p:sp>
+        <p:nvSpPr>
+          <p:cNvPr id="11" name="Slide Number Placeholder 3">
+            <a:extLst>
+              <a:ext uri="{FF2B5EF4-FFF2-40B4-BE49-F238E27FC236}">
+                <a16:creationId xmlns:a16="http://schemas.microsoft.com/office/drawing/2014/main" id="{C1A090DB-1BA1-4445-A291-0392C30C54C2}"/>
+              </a:ext>
+            </a:extLst>
+          </p:cNvPr>
+          <p:cNvSpPr>
+            <a:spLocks noGrp="1"/>
+          </p:cNvSpPr>
+          <p:nvPr>
+            <p:ph type="sldNum" sz="quarter" idx="10"/>
+          </p:nvPr>
+        </p:nvSpPr>
+        <p:spPr>
+          <a:xfrm>
+            <a:off x="609600" y="6477000"/>
+            <a:ext cx="2540000" cy="457200"/>
+          </a:xfrm>
+        </p:spPr>
+        <p:txBody>
+          <a:bodyPr/>
+          <a:lstStyle/>
+          <a:p>
+            <a:pPr>
+              <a:defRPr/>
+            </a:pPr>
+            <a:fld id="{A27591B5-593E-49C1-8C2D-4B5CC8495990}" type="slidenum">
+              <a:rPr lang="en-US" smtClean="0"/>
+              <a:pPr>
+                <a:defRPr/>
+              </a:pPr>
+              <a:t>5</a:t>
+            </a:fld>
+            <a:endParaRPr lang="en-US" dirty="0"/>
           </a:p>
         </p:txBody>
       </p:sp>
@@ -8360,7 +9554,7 @@
           <a:p>
             <a:r>
               <a:rPr lang="en-ZA" dirty="0"/>
-              <a:t>Solutions</a:t>
+              <a:t>Solution</a:t>
             </a:r>
           </a:p>
         </p:txBody>
@@ -8472,6 +9666,106 @@
           </a:prstGeom>
         </p:spPr>
       </p:pic>
+      <p:sp>
+        <p:nvSpPr>
+          <p:cNvPr id="7" name="Oval 6">
+            <a:extLst>
+              <a:ext uri="{FF2B5EF4-FFF2-40B4-BE49-F238E27FC236}">
+                <a16:creationId xmlns:a16="http://schemas.microsoft.com/office/drawing/2014/main" id="{19764D35-264E-4647-9F4B-F1FEB33D4792}"/>
+              </a:ext>
+            </a:extLst>
+          </p:cNvPr>
+          <p:cNvSpPr/>
+          <p:nvPr/>
+        </p:nvSpPr>
+        <p:spPr>
+          <a:xfrm>
+            <a:off x="1448496" y="1640236"/>
+            <a:ext cx="4248919" cy="4552479"/>
+          </a:xfrm>
+          <a:prstGeom prst="ellipse">
+            <a:avLst/>
+          </a:prstGeom>
+          <a:noFill/>
+          <a:ln>
+            <a:solidFill>
+              <a:srgbClr val="FF0000"/>
+            </a:solidFill>
+          </a:ln>
+        </p:spPr>
+        <p:style>
+          <a:lnRef idx="2">
+            <a:schemeClr val="accent6"/>
+          </a:lnRef>
+          <a:fillRef idx="1">
+            <a:schemeClr val="lt1"/>
+          </a:fillRef>
+          <a:effectRef idx="0">
+            <a:schemeClr val="accent6"/>
+          </a:effectRef>
+          <a:fontRef idx="minor">
+            <a:schemeClr val="dk1"/>
+          </a:fontRef>
+        </p:style>
+        <p:txBody>
+          <a:bodyPr rtlCol="0" anchor="ctr"/>
+          <a:lstStyle/>
+          <a:p>
+            <a:pPr algn="ctr"/>
+            <a:endParaRPr lang="en-ZA"/>
+          </a:p>
+        </p:txBody>
+      </p:sp>
+      <p:sp>
+        <p:nvSpPr>
+          <p:cNvPr id="8" name="Oval 7">
+            <a:extLst>
+              <a:ext uri="{FF2B5EF4-FFF2-40B4-BE49-F238E27FC236}">
+                <a16:creationId xmlns:a16="http://schemas.microsoft.com/office/drawing/2014/main" id="{6A18253D-78F8-46D2-98D6-22694A8CDA71}"/>
+              </a:ext>
+            </a:extLst>
+          </p:cNvPr>
+          <p:cNvSpPr/>
+          <p:nvPr/>
+        </p:nvSpPr>
+        <p:spPr>
+          <a:xfrm>
+            <a:off x="8739945" y="1924521"/>
+            <a:ext cx="1519311" cy="4552479"/>
+          </a:xfrm>
+          <a:prstGeom prst="ellipse">
+            <a:avLst/>
+          </a:prstGeom>
+          <a:noFill/>
+          <a:ln>
+            <a:solidFill>
+              <a:srgbClr val="FF0000"/>
+            </a:solidFill>
+          </a:ln>
+        </p:spPr>
+        <p:style>
+          <a:lnRef idx="2">
+            <a:schemeClr val="accent6"/>
+          </a:lnRef>
+          <a:fillRef idx="1">
+            <a:schemeClr val="lt1"/>
+          </a:fillRef>
+          <a:effectRef idx="0">
+            <a:schemeClr val="accent6"/>
+          </a:effectRef>
+          <a:fontRef idx="minor">
+            <a:schemeClr val="dk1"/>
+          </a:fontRef>
+        </p:style>
+        <p:txBody>
+          <a:bodyPr rtlCol="0" anchor="ctr"/>
+          <a:lstStyle/>
+          <a:p>
+            <a:pPr algn="ctr"/>
+            <a:endParaRPr lang="en-ZA"/>
+          </a:p>
+        </p:txBody>
+      </p:sp>
     </p:spTree>
     <p:extLst>
       <p:ext uri="{BB962C8B-B14F-4D97-AF65-F5344CB8AC3E}">
@@ -8482,84 +9776,6 @@
   <p:clrMapOvr>
     <a:masterClrMapping/>
   </p:clrMapOvr>
-  <p:timing>
-    <p:tnLst>
-      <p:par>
-        <p:cTn id="1" dur="indefinite" restart="never" nodeType="tmRoot">
-          <p:childTnLst>
-            <p:seq concurrent="1" nextAc="seek">
-              <p:cTn id="2" dur="indefinite" nodeType="mainSeq">
-                <p:childTnLst>
-                  <p:par>
-                    <p:cTn id="3" fill="hold">
-                      <p:stCondLst>
-                        <p:cond delay="indefinite"/>
-                        <p:cond evt="onBegin" delay="0">
-                          <p:tn val="2"/>
-                        </p:cond>
-                      </p:stCondLst>
-                      <p:childTnLst>
-                        <p:par>
-                          <p:cTn id="4" fill="hold">
-                            <p:stCondLst>
-                              <p:cond delay="0"/>
-                            </p:stCondLst>
-                            <p:childTnLst>
-                              <p:par>
-                                <p:cTn id="5" presetID="1" presetClass="entr" presetSubtype="0" fill="hold" nodeType="withEffect">
-                                  <p:stCondLst>
-                                    <p:cond delay="0"/>
-                                  </p:stCondLst>
-                                  <p:childTnLst>
-                                    <p:set>
-                                      <p:cBhvr>
-                                        <p:cTn id="6" dur="1" fill="hold">
-                                          <p:stCondLst>
-                                            <p:cond delay="0"/>
-                                          </p:stCondLst>
-                                        </p:cTn>
-                                        <p:tgtEl>
-                                          <p:spTgt spid="6"/>
-                                        </p:tgtEl>
-                                        <p:attrNameLst>
-                                          <p:attrName>style.visibility</p:attrName>
-                                        </p:attrNameLst>
-                                      </p:cBhvr>
-                                      <p:to>
-                                        <p:strVal val="visible"/>
-                                      </p:to>
-                                    </p:set>
-                                  </p:childTnLst>
-                                </p:cTn>
-                              </p:par>
-                            </p:childTnLst>
-                          </p:cTn>
-                        </p:par>
-                      </p:childTnLst>
-                    </p:cTn>
-                  </p:par>
-                </p:childTnLst>
-              </p:cTn>
-              <p:prevCondLst>
-                <p:cond evt="onPrev" delay="0">
-                  <p:tgtEl>
-                    <p:sldTgt/>
-                  </p:tgtEl>
-                </p:cond>
-              </p:prevCondLst>
-              <p:nextCondLst>
-                <p:cond evt="onNext" delay="0">
-                  <p:tgtEl>
-                    <p:sldTgt/>
-                  </p:tgtEl>
-                </p:cond>
-              </p:nextCondLst>
-            </p:seq>
-          </p:childTnLst>
-        </p:cTn>
-      </p:par>
-    </p:tnLst>
-  </p:timing>
 </p:sld>
 </file>
 
@@ -9049,8 +10265,8 @@
         </p:nvSpPr>
         <p:spPr bwMode="auto">
           <a:xfrm>
-            <a:off x="8414335" y="3471189"/>
-            <a:ext cx="1978564" cy="1865140"/>
+            <a:off x="8414335" y="3766534"/>
+            <a:ext cx="1978564" cy="1283691"/>
           </a:xfrm>
           <a:prstGeom prst="roundRect">
             <a:avLst/>
@@ -9246,8 +10462,8 @@
         </p:nvCxnSpPr>
         <p:spPr bwMode="auto">
           <a:xfrm flipV="1">
-            <a:off x="6176489" y="4403759"/>
-            <a:ext cx="2237846" cy="452962"/>
+            <a:off x="6176489" y="4408380"/>
+            <a:ext cx="2237846" cy="448341"/>
           </a:xfrm>
           <a:prstGeom prst="straightConnector1">
             <a:avLst/>
@@ -9285,8 +10501,8 @@
         </p:nvCxnSpPr>
         <p:spPr bwMode="auto">
           <a:xfrm>
-            <a:off x="10392899" y="4403759"/>
-            <a:ext cx="193821" cy="4621"/>
+            <a:off x="10392899" y="4408380"/>
+            <a:ext cx="193821" cy="0"/>
           </a:xfrm>
           <a:prstGeom prst="straightConnector1">
             <a:avLst/>
@@ -9325,7 +10541,7 @@
         <p:spPr bwMode="auto">
           <a:xfrm>
             <a:off x="8002163" y="3772106"/>
-            <a:ext cx="412172" cy="631653"/>
+            <a:ext cx="412172" cy="636274"/>
           </a:xfrm>
           <a:prstGeom prst="straightConnector1">
             <a:avLst/>

</xml_diff>

<commit_message>
Hopefull final version is up now.
</commit_message>
<xml_diff>
--- a/OralExamination/SkripsieOral_APSmit.pptx
+++ b/OralExamination/SkripsieOral_APSmit.pptx
@@ -1138,6 +1138,96 @@
 </p:notes>
 </file>
 
+<file path=ppt/notesSlides/notesSlide11.xml><?xml version="1.0" encoding="utf-8"?>
+<p:notes xmlns:a="http://schemas.openxmlformats.org/drawingml/2006/main" xmlns:r="http://schemas.openxmlformats.org/officeDocument/2006/relationships" xmlns:p="http://schemas.openxmlformats.org/presentationml/2006/main">
+  <p:cSld>
+    <p:spTree>
+      <p:nvGrpSpPr>
+        <p:cNvPr id="1" name=""/>
+        <p:cNvGrpSpPr/>
+        <p:nvPr/>
+      </p:nvGrpSpPr>
+      <p:grpSpPr>
+        <a:xfrm>
+          <a:off x="0" y="0"/>
+          <a:ext cx="0" cy="0"/>
+          <a:chOff x="0" y="0"/>
+          <a:chExt cx="0" cy="0"/>
+        </a:xfrm>
+      </p:grpSpPr>
+      <p:sp>
+        <p:nvSpPr>
+          <p:cNvPr id="2" name="Slide Image Placeholder 1"/>
+          <p:cNvSpPr>
+            <a:spLocks noGrp="1" noRot="1" noChangeAspect="1"/>
+          </p:cNvSpPr>
+          <p:nvPr>
+            <p:ph type="sldImg"/>
+          </p:nvPr>
+        </p:nvSpPr>
+        <p:spPr/>
+      </p:sp>
+      <p:sp>
+        <p:nvSpPr>
+          <p:cNvPr id="3" name="Notes Placeholder 2"/>
+          <p:cNvSpPr>
+            <a:spLocks noGrp="1"/>
+          </p:cNvSpPr>
+          <p:nvPr>
+            <p:ph type="body" idx="1"/>
+          </p:nvPr>
+        </p:nvSpPr>
+        <p:spPr/>
+        <p:txBody>
+          <a:bodyPr/>
+          <a:lstStyle/>
+          <a:p>
+            <a:endParaRPr lang="en-ZA" dirty="0"/>
+          </a:p>
+        </p:txBody>
+      </p:sp>
+      <p:sp>
+        <p:nvSpPr>
+          <p:cNvPr id="4" name="Slide Number Placeholder 3"/>
+          <p:cNvSpPr>
+            <a:spLocks noGrp="1"/>
+          </p:cNvSpPr>
+          <p:nvPr>
+            <p:ph type="sldNum" sz="quarter" idx="10"/>
+          </p:nvPr>
+        </p:nvSpPr>
+        <p:spPr/>
+        <p:txBody>
+          <a:bodyPr/>
+          <a:lstStyle/>
+          <a:p>
+            <a:pPr>
+              <a:defRPr/>
+            </a:pPr>
+            <a:fld id="{2AABE78A-E99E-4C1C-B170-1B5F1DA6AE54}" type="slidenum">
+              <a:rPr lang="en-US" smtClean="0"/>
+              <a:pPr>
+                <a:defRPr/>
+              </a:pPr>
+              <a:t>15</a:t>
+            </a:fld>
+            <a:endParaRPr lang="en-US" dirty="0"/>
+          </a:p>
+        </p:txBody>
+      </p:sp>
+    </p:spTree>
+    <p:extLst>
+      <p:ext uri="{BB962C8B-B14F-4D97-AF65-F5344CB8AC3E}">
+        <p14:creationId xmlns:p14="http://schemas.microsoft.com/office/powerpoint/2010/main" val="3687232425"/>
+      </p:ext>
+    </p:extLst>
+  </p:cSld>
+  <p:clrMapOvr>
+    <a:masterClrMapping/>
+  </p:clrMapOvr>
+</p:notes>
+</file>
+
 <file path=ppt/notesSlides/notesSlide2.xml><?xml version="1.0" encoding="utf-8"?>
 <p:notes xmlns:a="http://schemas.openxmlformats.org/drawingml/2006/main" xmlns:r="http://schemas.openxmlformats.org/officeDocument/2006/relationships" xmlns:p="http://schemas.openxmlformats.org/presentationml/2006/main">
   <p:cSld>
@@ -1181,6 +1271,77 @@
         <p:txBody>
           <a:bodyPr/>
           <a:lstStyle/>
+          <a:p>
+            <a:pPr marL="342900" indent="-342900">
+              <a:buFont typeface="Arial" panose="020B0604020202020204" pitchFamily="34" charset="0"/>
+              <a:buChar char="•"/>
+            </a:pPr>
+            <a:r>
+              <a:rPr lang="en-ZA" dirty="0">
+                <a:effectLst/>
+              </a:rPr>
+              <a:t>Tutors and teaching assistant grade tests incorrectly</a:t>
+            </a:r>
+          </a:p>
+          <a:p>
+            <a:pPr marL="285750" indent="-285750">
+              <a:buFont typeface="Arial" panose="020B0604020202020204" pitchFamily="34" charset="0"/>
+              <a:buChar char="•"/>
+            </a:pPr>
+            <a:endParaRPr lang="en-ZA" dirty="0">
+              <a:effectLst/>
+            </a:endParaRPr>
+          </a:p>
+          <a:p>
+            <a:pPr marL="285750" indent="-285750">
+              <a:buFont typeface="Arial" panose="020B0604020202020204" pitchFamily="34" charset="0"/>
+              <a:buChar char="•"/>
+            </a:pPr>
+            <a:r>
+              <a:rPr lang="en-ZA" dirty="0">
+                <a:effectLst/>
+              </a:rPr>
+              <a:t>Online tests impractical due to class size</a:t>
+            </a:r>
+          </a:p>
+          <a:p>
+            <a:endParaRPr lang="en-ZA" dirty="0">
+              <a:effectLst/>
+            </a:endParaRPr>
+          </a:p>
+          <a:p>
+            <a:pPr marL="285750" indent="-285750">
+              <a:buFont typeface="Arial" panose="020B0604020202020204" pitchFamily="34" charset="0"/>
+              <a:buChar char="•"/>
+            </a:pPr>
+            <a:r>
+              <a:rPr lang="en-ZA" dirty="0">
+                <a:effectLst/>
+              </a:rPr>
+              <a:t>Current Optical Marker Recognition systems require special scanners</a:t>
+            </a:r>
+          </a:p>
+          <a:p>
+            <a:pPr marL="285750" indent="-285750">
+              <a:buFont typeface="Arial" panose="020B0604020202020204" pitchFamily="34" charset="0"/>
+              <a:buChar char="•"/>
+            </a:pPr>
+            <a:endParaRPr lang="en-ZA" dirty="0">
+              <a:effectLst/>
+            </a:endParaRPr>
+          </a:p>
+          <a:p>
+            <a:pPr marL="285750" indent="-285750">
+              <a:buFont typeface="Arial" panose="020B0604020202020204" pitchFamily="34" charset="0"/>
+              <a:buChar char="•"/>
+            </a:pPr>
+            <a:r>
+              <a:rPr lang="en-ZA" dirty="0">
+                <a:effectLst/>
+              </a:rPr>
+              <a:t>Current Optical Marker Recognition systems are difficult to use</a:t>
+            </a:r>
+          </a:p>
           <a:p>
             <a:endParaRPr lang="en-ZA" dirty="0"/>
           </a:p>
@@ -5402,6 +5563,9 @@
           <a:bodyPr/>
           <a:lstStyle/>
           <a:p>
+            <a:pPr marL="0" indent="0">
+              <a:buNone/>
+            </a:pPr>
             <a:r>
               <a:rPr lang="en-ZA" kern="1200" dirty="0">
                 <a:effectLst>
@@ -5413,13 +5577,13 @@
                 </a:effectLst>
                 <a:latin typeface="Times New Roman" pitchFamily="18" charset="0"/>
               </a:rPr>
-              <a:t> </a:t>
+              <a:t>1</a:t>
             </a:r>
             <a:r>
               <a:rPr lang="en-ZA" kern="1200" dirty="0">
                 <a:latin typeface="Times New Roman" pitchFamily="18" charset="0"/>
               </a:rPr>
-              <a:t>First step is to find the orientation of the template</a:t>
+              <a:t>) Orientation of the template</a:t>
             </a:r>
           </a:p>
           <a:p>
@@ -6597,7 +6761,7 @@
         <p:spPr>
           <a:xfrm>
             <a:off x="847630" y="1203751"/>
-            <a:ext cx="6917735" cy="461665"/>
+            <a:ext cx="9907902" cy="461665"/>
           </a:xfrm>
           <a:prstGeom prst="rect">
             <a:avLst/>
@@ -6613,7 +6777,7 @@
               <a:rPr lang="en-ZA" dirty="0">
                 <a:effectLst/>
               </a:rPr>
-              <a:t>The bubble locations can then be found and processed.</a:t>
+              <a:t>2) Process bubbles</a:t>
             </a:r>
           </a:p>
         </p:txBody>
@@ -6889,7 +7053,7 @@
               <a:rPr lang="en-ZA" kern="1200" dirty="0">
                 <a:latin typeface="Times New Roman" pitchFamily="18" charset="0"/>
               </a:rPr>
-              <a:t>Initial image processing is done on the digit using a custom segmentation algorithm</a:t>
+              <a:t>Custom segmentation algorithm</a:t>
             </a:r>
           </a:p>
         </p:txBody>
@@ -8031,76 +8195,306 @@
           </a:p>
         </p:txBody>
       </p:sp>
-      <p:pic>
-        <p:nvPicPr>
-          <p:cNvPr id="14" name="Content Placeholder 13">
+      <p:sp>
+        <p:nvSpPr>
+          <p:cNvPr id="6" name="Oval 5">
             <a:extLst>
               <a:ext uri="{FF2B5EF4-FFF2-40B4-BE49-F238E27FC236}">
-                <a16:creationId xmlns:a16="http://schemas.microsoft.com/office/drawing/2014/main" id="{01959AA6-403D-4F83-AE3A-0CDB9297E10C}"/>
+                <a16:creationId xmlns:a16="http://schemas.microsoft.com/office/drawing/2014/main" id="{0B4E4821-9AF7-47E8-9E22-27A416093DBE}"/>
               </a:ext>
             </a:extLst>
           </p:cNvPr>
-          <p:cNvPicPr>
-            <a:picLocks noGrp="1" noChangeAspect="1"/>
-          </p:cNvPicPr>
-          <p:nvPr>
-            <p:ph idx="1"/>
-          </p:nvPr>
-        </p:nvPicPr>
-        <p:blipFill>
-          <a:blip r:embed="rId3">
-            <a:extLst>
-              <a:ext uri="{28A0092B-C50C-407E-A947-70E740481C1C}">
-                <a14:useLocalDpi xmlns:a14="http://schemas.microsoft.com/office/drawing/2010/main" val="0"/>
-              </a:ext>
-            </a:extLst>
-          </a:blip>
-          <a:stretch>
-            <a:fillRect/>
-          </a:stretch>
-        </p:blipFill>
-        <p:spPr>
+          <p:cNvSpPr/>
+          <p:nvPr/>
+        </p:nvSpPr>
+        <p:spPr bwMode="auto">
           <a:xfrm>
-            <a:off x="4996016" y="2365098"/>
-            <a:ext cx="5963107" cy="2753002"/>
+            <a:off x="2966332" y="3984086"/>
+            <a:ext cx="2368059" cy="1083212"/>
           </a:xfrm>
+          <a:prstGeom prst="ellipse">
+            <a:avLst/>
+          </a:prstGeom>
+          <a:solidFill>
+            <a:schemeClr val="accent1"/>
+          </a:solidFill>
+          <a:ln w="12700" cap="sq" cmpd="sng" algn="ctr">
+            <a:solidFill>
+              <a:schemeClr val="tx1"/>
+            </a:solidFill>
+            <a:prstDash val="solid"/>
+            <a:round/>
+            <a:headEnd type="none" w="sm" len="sm"/>
+            <a:tailEnd type="none" w="sm" len="sm"/>
+          </a:ln>
+          <a:effectLst/>
         </p:spPr>
-      </p:pic>
-      <p:pic>
-        <p:nvPicPr>
-          <p:cNvPr id="15" name="Picture 14">
+        <p:txBody>
+          <a:bodyPr vert="horz" wrap="square" lIns="91440" tIns="45720" rIns="91440" bIns="45720" numCol="1" rtlCol="0" anchor="t" anchorCtr="0" compatLnSpc="1">
+            <a:prstTxWarp prst="textNoShape">
+              <a:avLst/>
+            </a:prstTxWarp>
+          </a:bodyPr>
+          <a:lstStyle/>
+          <a:p>
+            <a:pPr marL="0" marR="0" indent="0" algn="ctr" defTabSz="914400" rtl="0" eaLnBrk="1" fontAlgn="base" latinLnBrk="0" hangingPunct="1">
+              <a:lnSpc>
+                <a:spcPct val="100000"/>
+              </a:lnSpc>
+              <a:spcBef>
+                <a:spcPct val="0"/>
+              </a:spcBef>
+              <a:spcAft>
+                <a:spcPct val="0"/>
+              </a:spcAft>
+              <a:buClrTx/>
+              <a:buSzTx/>
+              <a:buFontTx/>
+              <a:buNone/>
+              <a:tabLst/>
+            </a:pPr>
+            <a:r>
+              <a:rPr kumimoji="0" lang="en-ZA" b="0" i="0" u="none" strike="noStrike" cap="none" normalizeH="0" baseline="0" dirty="0">
+                <a:ln>
+                  <a:noFill/>
+                </a:ln>
+                <a:solidFill>
+                  <a:schemeClr val="tx1"/>
+                </a:solidFill>
+                <a:effectLst/>
+                <a:latin typeface="Times New Roman" pitchFamily="18" charset="0"/>
+              </a:rPr>
+              <a:t>Bubble evidence</a:t>
+            </a:r>
+          </a:p>
+        </p:txBody>
+      </p:sp>
+      <p:sp>
+        <p:nvSpPr>
+          <p:cNvPr id="9" name="Oval 8">
             <a:extLst>
               <a:ext uri="{FF2B5EF4-FFF2-40B4-BE49-F238E27FC236}">
-                <a16:creationId xmlns:a16="http://schemas.microsoft.com/office/drawing/2014/main" id="{8AC5C5D7-DBF4-4537-BC6A-8555EA8702D8}"/>
+                <a16:creationId xmlns:a16="http://schemas.microsoft.com/office/drawing/2014/main" id="{A8AB9DB8-24DF-458C-B2AA-6EDF073970A9}"/>
               </a:ext>
             </a:extLst>
           </p:cNvPr>
-          <p:cNvPicPr>
-            <a:picLocks noChangeAspect="1"/>
-          </p:cNvPicPr>
+          <p:cNvSpPr/>
           <p:nvPr/>
-        </p:nvPicPr>
-        <p:blipFill rotWithShape="1">
-          <a:blip r:embed="rId4" cstate="print">
+        </p:nvSpPr>
+        <p:spPr bwMode="auto">
+          <a:xfrm>
+            <a:off x="7264009" y="3984086"/>
+            <a:ext cx="2254283" cy="1083212"/>
+          </a:xfrm>
+          <a:prstGeom prst="ellipse">
+            <a:avLst/>
+          </a:prstGeom>
+          <a:solidFill>
+            <a:schemeClr val="accent1"/>
+          </a:solidFill>
+          <a:ln w="12700" cap="sq" cmpd="sng" algn="ctr">
+            <a:solidFill>
+              <a:schemeClr val="tx1"/>
+            </a:solidFill>
+            <a:prstDash val="solid"/>
+            <a:round/>
+            <a:headEnd type="none" w="sm" len="sm"/>
+            <a:tailEnd type="none" w="sm" len="sm"/>
+          </a:ln>
+          <a:effectLst/>
+        </p:spPr>
+        <p:txBody>
+          <a:bodyPr vert="horz" wrap="square" lIns="91440" tIns="45720" rIns="91440" bIns="45720" numCol="1" rtlCol="0" anchor="t" anchorCtr="0" compatLnSpc="1">
+            <a:prstTxWarp prst="textNoShape">
+              <a:avLst/>
+            </a:prstTxWarp>
+          </a:bodyPr>
+          <a:lstStyle/>
+          <a:p>
+            <a:pPr marL="0" marR="0" indent="0" algn="ctr" defTabSz="914400" rtl="0" eaLnBrk="1" fontAlgn="base" latinLnBrk="0" hangingPunct="1">
+              <a:lnSpc>
+                <a:spcPct val="100000"/>
+              </a:lnSpc>
+              <a:spcBef>
+                <a:spcPct val="0"/>
+              </a:spcBef>
+              <a:spcAft>
+                <a:spcPct val="0"/>
+              </a:spcAft>
+              <a:buClrTx/>
+              <a:buSzTx/>
+              <a:buFontTx/>
+              <a:buNone/>
+              <a:tabLst/>
+            </a:pPr>
+            <a:r>
+              <a:rPr kumimoji="0" lang="en-ZA" sz="2400" b="0" i="0" u="none" strike="noStrike" cap="none" normalizeH="0" baseline="0" dirty="0">
+                <a:ln>
+                  <a:noFill/>
+                </a:ln>
+                <a:solidFill>
+                  <a:schemeClr val="tx1"/>
+                </a:solidFill>
+                <a:effectLst/>
+                <a:latin typeface="Times New Roman" pitchFamily="18" charset="0"/>
+              </a:rPr>
+              <a:t>Character priors</a:t>
+            </a:r>
+          </a:p>
+        </p:txBody>
+      </p:sp>
+      <p:sp>
+        <p:nvSpPr>
+          <p:cNvPr id="10" name="Oval 9">
             <a:extLst>
-              <a:ext uri="{28A0092B-C50C-407E-A947-70E740481C1C}">
-                <a14:useLocalDpi xmlns:a14="http://schemas.microsoft.com/office/drawing/2010/main" val="0"/>
+              <a:ext uri="{FF2B5EF4-FFF2-40B4-BE49-F238E27FC236}">
+                <a16:creationId xmlns:a16="http://schemas.microsoft.com/office/drawing/2014/main" id="{15A91DCE-E2DD-4837-93FF-9A9057293D60}"/>
               </a:ext>
             </a:extLst>
-          </a:blip>
-          <a:srcRect l="47229" t="67435" r="11364" b="2492"/>
-          <a:stretch/>
-        </p:blipFill>
-        <p:spPr>
+          </p:cNvPr>
+          <p:cNvSpPr/>
+          <p:nvPr/>
+        </p:nvSpPr>
+        <p:spPr bwMode="auto">
           <a:xfrm>
-            <a:off x="965200" y="2002745"/>
-            <a:ext cx="3060700" cy="3115355"/>
+            <a:off x="5334391" y="2243529"/>
+            <a:ext cx="1929618" cy="1083212"/>
           </a:xfrm>
-          <a:prstGeom prst="rect">
+          <a:prstGeom prst="ellipse">
             <a:avLst/>
           </a:prstGeom>
+          <a:solidFill>
+            <a:schemeClr val="accent1"/>
+          </a:solidFill>
+          <a:ln w="12700" cap="sq" cmpd="sng" algn="ctr">
+            <a:solidFill>
+              <a:schemeClr val="tx1"/>
+            </a:solidFill>
+            <a:prstDash val="solid"/>
+            <a:round/>
+            <a:headEnd type="none" w="sm" len="sm"/>
+            <a:tailEnd type="none" w="sm" len="sm"/>
+          </a:ln>
+          <a:effectLst/>
         </p:spPr>
-      </p:pic>
+        <p:txBody>
+          <a:bodyPr vert="horz" wrap="square" lIns="91440" tIns="45720" rIns="91440" bIns="45720" numCol="1" rtlCol="0" anchor="t" anchorCtr="0" compatLnSpc="1">
+            <a:prstTxWarp prst="textNoShape">
+              <a:avLst/>
+            </a:prstTxWarp>
+          </a:bodyPr>
+          <a:lstStyle/>
+          <a:p>
+            <a:pPr marL="0" marR="0" indent="0" algn="ctr" defTabSz="914400" rtl="0" eaLnBrk="1" fontAlgn="base" latinLnBrk="0" hangingPunct="1">
+              <a:lnSpc>
+                <a:spcPct val="100000"/>
+              </a:lnSpc>
+              <a:spcBef>
+                <a:spcPct val="0"/>
+              </a:spcBef>
+              <a:spcAft>
+                <a:spcPct val="0"/>
+              </a:spcAft>
+              <a:buClrTx/>
+              <a:buSzTx/>
+              <a:buFontTx/>
+              <a:buNone/>
+              <a:tabLst/>
+            </a:pPr>
+            <a:r>
+              <a:rPr kumimoji="0" lang="en-ZA" sz="2400" b="0" i="0" u="none" strike="noStrike" cap="none" normalizeH="0" baseline="0" dirty="0">
+                <a:ln>
+                  <a:noFill/>
+                </a:ln>
+                <a:solidFill>
+                  <a:schemeClr val="tx1"/>
+                </a:solidFill>
+                <a:effectLst/>
+                <a:latin typeface="Times New Roman" pitchFamily="18" charset="0"/>
+              </a:rPr>
+              <a:t>True Answer</a:t>
+            </a:r>
+          </a:p>
+        </p:txBody>
+      </p:sp>
+      <p:cxnSp>
+        <p:nvCxnSpPr>
+          <p:cNvPr id="8" name="Straight Arrow Connector 7">
+            <a:extLst>
+              <a:ext uri="{FF2B5EF4-FFF2-40B4-BE49-F238E27FC236}">
+                <a16:creationId xmlns:a16="http://schemas.microsoft.com/office/drawing/2014/main" id="{A8127AC8-684F-4AEA-9EC8-C0B6D2BAB9ED}"/>
+              </a:ext>
+            </a:extLst>
+          </p:cNvPr>
+          <p:cNvCxnSpPr>
+            <a:cxnSpLocks/>
+            <a:stCxn id="10" idx="4"/>
+            <a:endCxn id="6" idx="0"/>
+          </p:cNvCxnSpPr>
+          <p:nvPr/>
+        </p:nvCxnSpPr>
+        <p:spPr bwMode="auto">
+          <a:xfrm flipH="1">
+            <a:off x="4150362" y="3326741"/>
+            <a:ext cx="2148838" cy="657345"/>
+          </a:xfrm>
+          <a:prstGeom prst="straightConnector1">
+            <a:avLst/>
+          </a:prstGeom>
+          <a:solidFill>
+            <a:schemeClr val="accent1"/>
+          </a:solidFill>
+          <a:ln w="12700" cap="sq" cmpd="sng" algn="ctr">
+            <a:solidFill>
+              <a:schemeClr val="tx1"/>
+            </a:solidFill>
+            <a:prstDash val="solid"/>
+            <a:round/>
+            <a:headEnd type="none" w="sm" len="sm"/>
+            <a:tailEnd type="triangle"/>
+          </a:ln>
+          <a:effectLst/>
+        </p:spPr>
+      </p:cxnSp>
+      <p:cxnSp>
+        <p:nvCxnSpPr>
+          <p:cNvPr id="12" name="Straight Arrow Connector 11">
+            <a:extLst>
+              <a:ext uri="{FF2B5EF4-FFF2-40B4-BE49-F238E27FC236}">
+                <a16:creationId xmlns:a16="http://schemas.microsoft.com/office/drawing/2014/main" id="{2BD7EDE1-7E8D-403E-AEE8-DBAAB3084583}"/>
+              </a:ext>
+            </a:extLst>
+          </p:cNvPr>
+          <p:cNvCxnSpPr>
+            <a:cxnSpLocks/>
+            <a:stCxn id="10" idx="4"/>
+            <a:endCxn id="9" idx="0"/>
+          </p:cNvCxnSpPr>
+          <p:nvPr/>
+        </p:nvCxnSpPr>
+        <p:spPr bwMode="auto">
+          <a:xfrm>
+            <a:off x="6299200" y="3326741"/>
+            <a:ext cx="2091951" cy="657345"/>
+          </a:xfrm>
+          <a:prstGeom prst="straightConnector1">
+            <a:avLst/>
+          </a:prstGeom>
+          <a:solidFill>
+            <a:schemeClr val="accent1"/>
+          </a:solidFill>
+          <a:ln w="12700" cap="sq" cmpd="sng" algn="ctr">
+            <a:solidFill>
+              <a:schemeClr val="tx1"/>
+            </a:solidFill>
+            <a:prstDash val="solid"/>
+            <a:round/>
+            <a:headEnd type="none" w="sm" len="sm"/>
+            <a:tailEnd type="triangle"/>
+          </a:ln>
+          <a:effectLst/>
+        </p:spPr>
+      </p:cxnSp>
     </p:spTree>
     <p:extLst>
       <p:ext uri="{BB962C8B-B14F-4D97-AF65-F5344CB8AC3E}">
@@ -9221,7 +9615,7 @@
           <a:p>
             <a:r>
               <a:rPr lang="en-ZA" dirty="0"/>
-              <a:t>Automatic grading accuracy 97.1%</a:t>
+              <a:t>New automatic grading accuracy 97.1%</a:t>
             </a:r>
           </a:p>
           <a:p>
@@ -9233,13 +9627,13 @@
           <a:p>
             <a:r>
               <a:rPr lang="en-ZA" dirty="0"/>
-              <a:t>In a tutorial session on average only 0.1% or 1 test or less is graded incorrectly</a:t>
+              <a:t>Only 0.1% or 1 test per tutorial graded incorrectly</a:t>
             </a:r>
           </a:p>
           <a:p>
             <a:r>
               <a:rPr lang="en-ZA" dirty="0"/>
-              <a:t>System has now been extended to 2 new templates</a:t>
+              <a:t>System extended to 2 new templates</a:t>
             </a:r>
           </a:p>
         </p:txBody>
@@ -9534,7 +9928,7 @@
         </p:blipFill>
         <p:spPr bwMode="auto">
           <a:xfrm>
-            <a:off x="8753328" y="3135995"/>
+            <a:off x="8753325" y="2482991"/>
             <a:ext cx="1659119" cy="701829"/>
           </a:xfrm>
           <a:prstGeom prst="rect">
@@ -9610,7 +10004,7 @@
         <p:spPr>
           <a:xfrm>
             <a:off x="677333" y="1337665"/>
-            <a:ext cx="7707085" cy="3785652"/>
+            <a:ext cx="7707085" cy="5262979"/>
           </a:xfrm>
           <a:prstGeom prst="rect">
             <a:avLst/>
@@ -9631,11 +10025,20 @@
               <a:rPr lang="en-ZA" dirty="0">
                 <a:effectLst/>
               </a:rPr>
-              <a:t>Tutors and teaching assistant grade tests incorrectly</a:t>
+              <a:t>Tutors and teaching assistants</a:t>
             </a:r>
           </a:p>
           <a:p>
-            <a:pPr marL="285750" indent="-285750">
+            <a:pPr marL="342900" indent="-342900">
+              <a:buFont typeface="Arial" panose="020B0604020202020204" pitchFamily="34" charset="0"/>
+              <a:buChar char="•"/>
+            </a:pPr>
+            <a:endParaRPr lang="en-ZA" dirty="0">
+              <a:effectLst/>
+            </a:endParaRPr>
+          </a:p>
+          <a:p>
+            <a:pPr marL="342900" indent="-342900">
               <a:buFont typeface="Arial" panose="020B0604020202020204" pitchFamily="34" charset="0"/>
               <a:buChar char="•"/>
             </a:pPr>
@@ -9652,16 +10055,42 @@
               <a:rPr lang="en-ZA" dirty="0">
                 <a:effectLst/>
               </a:rPr>
-              <a:t>Online tests impractical due to class size</a:t>
+              <a:t>Online tests impractical</a:t>
             </a:r>
           </a:p>
           <a:p>
+            <a:pPr marL="285750" indent="-285750">
+              <a:buFont typeface="Arial" panose="020B0604020202020204" pitchFamily="34" charset="0"/>
+              <a:buChar char="•"/>
+            </a:pPr>
             <a:endParaRPr lang="en-ZA" dirty="0">
               <a:effectLst/>
             </a:endParaRPr>
           </a:p>
           <a:p>
             <a:pPr marL="285750" indent="-285750">
+              <a:buFont typeface="Arial" panose="020B0604020202020204" pitchFamily="34" charset="0"/>
+              <a:buChar char="•"/>
+            </a:pPr>
+            <a:endParaRPr lang="en-ZA" dirty="0">
+              <a:effectLst/>
+            </a:endParaRPr>
+          </a:p>
+          <a:p>
+            <a:r>
+              <a:rPr lang="en-ZA" dirty="0">
+                <a:effectLst/>
+              </a:rPr>
+              <a:t>Current Optical Marker Recognition</a:t>
+            </a:r>
+          </a:p>
+          <a:p>
+            <a:endParaRPr lang="en-ZA" dirty="0">
+              <a:effectLst/>
+            </a:endParaRPr>
+          </a:p>
+          <a:p>
+            <a:pPr marL="742950" lvl="1" indent="-285750">
               <a:buFont typeface="Arial" panose="020B0604020202020204" pitchFamily="34" charset="0"/>
               <a:buChar char="•"/>
             </a:pPr>
@@ -9669,7 +10098,7 @@
               <a:rPr lang="en-ZA" dirty="0">
                 <a:effectLst/>
               </a:rPr>
-              <a:t>Current OMR systems require special scanners</a:t>
+              <a:t>Special scanners</a:t>
             </a:r>
           </a:p>
           <a:p>
@@ -9682,7 +10111,7 @@
             </a:endParaRPr>
           </a:p>
           <a:p>
-            <a:pPr marL="285750" indent="-285750">
+            <a:pPr marL="742950" lvl="1" indent="-285750">
               <a:buFont typeface="Arial" panose="020B0604020202020204" pitchFamily="34" charset="0"/>
               <a:buChar char="•"/>
             </a:pPr>
@@ -9690,7 +10119,7 @@
               <a:rPr lang="en-ZA" dirty="0">
                 <a:effectLst/>
               </a:rPr>
-              <a:t>Current OMR systems are difficult to use</a:t>
+              <a:t>Difficult to use</a:t>
             </a:r>
           </a:p>
           <a:p>
@@ -9739,7 +10168,7 @@
         </p:blipFill>
         <p:spPr bwMode="auto">
           <a:xfrm>
-            <a:off x="7934175" y="4753411"/>
+            <a:off x="7934175" y="5217869"/>
             <a:ext cx="3297421" cy="1248215"/>
           </a:xfrm>
           <a:prstGeom prst="rect">
@@ -9786,7 +10215,7 @@
         </p:blipFill>
         <p:spPr bwMode="auto">
           <a:xfrm>
-            <a:off x="8813974" y="3899064"/>
+            <a:off x="8874619" y="4378200"/>
             <a:ext cx="1537825" cy="854347"/>
           </a:xfrm>
           <a:prstGeom prst="rect">
@@ -10183,7 +10612,7 @@
                 <a:effectLst/>
                 <a:latin typeface="Times New Roman" pitchFamily="18" charset="0"/>
               </a:rPr>
-              <a:t>Template that allows for decimal valued answers</a:t>
+              <a:t>Template allows decimal valued answers</a:t>
             </a:r>
           </a:p>
           <a:p>
@@ -10212,7 +10641,7 @@
                 <a:effectLst/>
                 <a:latin typeface="Times New Roman" pitchFamily="18" charset="0"/>
               </a:rPr>
-              <a:t>Software that can handle crossed-out answers</a:t>
+              <a:t>Software handles crossed-out answers</a:t>
             </a:r>
           </a:p>
           <a:p>
@@ -10241,7 +10670,7 @@
                 <a:effectLst/>
                 <a:latin typeface="Times New Roman" pitchFamily="18" charset="0"/>
               </a:rPr>
-              <a:t>Software also identifies characters through character recognition to increase reliability</a:t>
+              <a:t>Character recognition to increase reliability</a:t>
             </a:r>
           </a:p>
           <a:p>

</xml_diff>

<commit_message>
Updated version of software
</commit_message>
<xml_diff>
--- a/OralExamination/SkripsieOral_APSmit.pptx
+++ b/OralExamination/SkripsieOral_APSmit.pptx
@@ -7146,7 +7146,7 @@
         <p:spPr bwMode="auto">
           <a:xfrm>
             <a:off x="529166" y="5085282"/>
-            <a:ext cx="5240867" cy="1772718"/>
+            <a:ext cx="5240867" cy="935690"/>
           </a:xfrm>
           <a:prstGeom prst="rect">
             <a:avLst/>
@@ -7353,7 +7353,7 @@
                 <a:effectLst/>
                 <a:latin typeface="Times New Roman" pitchFamily="18" charset="0"/>
               </a:rPr>
-              <a:t>Convolutional neural network classifies digits implemented in </a:t>
+              <a:t>Convolutional neural network in </a:t>
             </a:r>
             <a:r>
               <a:rPr lang="en-ZA" kern="1200" dirty="0" err="1">

</xml_diff>